<commit_message>
add some change again
</commit_message>
<xml_diff>
--- a/doc/NoSQL vs SQL.pptx
+++ b/doc/NoSQL vs SQL.pptx
@@ -5,7 +5,7 @@
     <p:sldMasterId id="2147483648" r:id="rId1"/>
   </p:sldMasterIdLst>
   <p:notesMasterIdLst>
-    <p:notesMasterId r:id="rId29"/>
+    <p:notesMasterId r:id="rId30"/>
   </p:notesMasterIdLst>
   <p:sldIdLst>
     <p:sldId id="256" r:id="rId2"/>
@@ -27,14 +27,15 @@
     <p:sldId id="271" r:id="rId18"/>
     <p:sldId id="272" r:id="rId19"/>
     <p:sldId id="273" r:id="rId20"/>
-    <p:sldId id="274" r:id="rId21"/>
-    <p:sldId id="275" r:id="rId22"/>
-    <p:sldId id="278" r:id="rId23"/>
-    <p:sldId id="279" r:id="rId24"/>
-    <p:sldId id="280" r:id="rId25"/>
-    <p:sldId id="281" r:id="rId26"/>
-    <p:sldId id="283" r:id="rId27"/>
-    <p:sldId id="282" r:id="rId28"/>
+    <p:sldId id="291" r:id="rId21"/>
+    <p:sldId id="274" r:id="rId22"/>
+    <p:sldId id="275" r:id="rId23"/>
+    <p:sldId id="278" r:id="rId24"/>
+    <p:sldId id="279" r:id="rId25"/>
+    <p:sldId id="280" r:id="rId26"/>
+    <p:sldId id="281" r:id="rId27"/>
+    <p:sldId id="283" r:id="rId28"/>
+    <p:sldId id="282" r:id="rId29"/>
   </p:sldIdLst>
   <p:sldSz cx="12192000" cy="6858000"/>
   <p:notesSz cx="6858000" cy="9144000"/>
@@ -364,11 +365,11 @@
         </c:dLbls>
         <c:gapWidth val="219"/>
         <c:overlap val="-27"/>
-        <c:axId val="-1241055264"/>
-        <c:axId val="-1241053088"/>
+        <c:axId val="-841735680"/>
+        <c:axId val="-783081504"/>
       </c:barChart>
       <c:catAx>
-        <c:axId val="-1241055264"/>
+        <c:axId val="-841735680"/>
         <c:scaling>
           <c:orientation val="minMax"/>
         </c:scaling>
@@ -411,7 +412,7 @@
             <a:endParaRPr lang="zh-CN"/>
           </a:p>
         </c:txPr>
-        <c:crossAx val="-1241053088"/>
+        <c:crossAx val="-783081504"/>
         <c:crosses val="autoZero"/>
         <c:auto val="1"/>
         <c:lblAlgn val="ctr"/>
@@ -419,7 +420,7 @@
         <c:noMultiLvlLbl val="0"/>
       </c:catAx>
       <c:valAx>
-        <c:axId val="-1241053088"/>
+        <c:axId val="-783081504"/>
         <c:scaling>
           <c:orientation val="minMax"/>
         </c:scaling>
@@ -470,7 +471,7 @@
             <a:endParaRPr lang="zh-CN"/>
           </a:p>
         </c:txPr>
-        <c:crossAx val="-1241055264"/>
+        <c:crossAx val="-841735680"/>
         <c:crosses val="autoZero"/>
         <c:crossBetween val="between"/>
       </c:valAx>
@@ -753,11 +754,11 @@
         </c:dLbls>
         <c:gapWidth val="219"/>
         <c:overlap val="-27"/>
-        <c:axId val="-1130874944"/>
-        <c:axId val="-1130869504"/>
+        <c:axId val="-783084768"/>
+        <c:axId val="-783082592"/>
       </c:barChart>
       <c:catAx>
-        <c:axId val="-1130874944"/>
+        <c:axId val="-783084768"/>
         <c:scaling>
           <c:orientation val="minMax"/>
         </c:scaling>
@@ -800,7 +801,7 @@
             <a:endParaRPr lang="zh-CN"/>
           </a:p>
         </c:txPr>
-        <c:crossAx val="-1130869504"/>
+        <c:crossAx val="-783082592"/>
         <c:crosses val="autoZero"/>
         <c:auto val="1"/>
         <c:lblAlgn val="ctr"/>
@@ -808,7 +809,7 @@
         <c:noMultiLvlLbl val="0"/>
       </c:catAx>
       <c:valAx>
-        <c:axId val="-1130869504"/>
+        <c:axId val="-783082592"/>
         <c:scaling>
           <c:orientation val="minMax"/>
         </c:scaling>
@@ -859,7 +860,7 @@
             <a:endParaRPr lang="zh-CN"/>
           </a:p>
         </c:txPr>
-        <c:crossAx val="-1130874944"/>
+        <c:crossAx val="-783084768"/>
         <c:crosses val="autoZero"/>
         <c:crossBetween val="between"/>
       </c:valAx>
@@ -1142,11 +1143,11 @@
         </c:dLbls>
         <c:gapWidth val="219"/>
         <c:overlap val="-27"/>
-        <c:axId val="-1130883104"/>
-        <c:axId val="-1130879296"/>
+        <c:axId val="-783083680"/>
+        <c:axId val="-783080960"/>
       </c:barChart>
       <c:catAx>
-        <c:axId val="-1130883104"/>
+        <c:axId val="-783083680"/>
         <c:scaling>
           <c:orientation val="minMax"/>
         </c:scaling>
@@ -1189,7 +1190,7 @@
             <a:endParaRPr lang="zh-CN"/>
           </a:p>
         </c:txPr>
-        <c:crossAx val="-1130879296"/>
+        <c:crossAx val="-783080960"/>
         <c:crosses val="autoZero"/>
         <c:auto val="1"/>
         <c:lblAlgn val="ctr"/>
@@ -1197,7 +1198,7 @@
         <c:noMultiLvlLbl val="0"/>
       </c:catAx>
       <c:valAx>
-        <c:axId val="-1130879296"/>
+        <c:axId val="-783080960"/>
         <c:scaling>
           <c:orientation val="minMax"/>
         </c:scaling>
@@ -1248,7 +1249,7 @@
             <a:endParaRPr lang="zh-CN"/>
           </a:p>
         </c:txPr>
-        <c:crossAx val="-1130883104"/>
+        <c:crossAx val="-783083680"/>
         <c:crosses val="autoZero"/>
         <c:crossBetween val="between"/>
       </c:valAx>
@@ -1620,11 +1621,11 @@
         </c:dLbls>
         <c:gapWidth val="219"/>
         <c:overlap val="-27"/>
-        <c:axId val="-1133023008"/>
-        <c:axId val="-1510237264"/>
+        <c:axId val="-783095104"/>
+        <c:axId val="-783091840"/>
       </c:barChart>
       <c:catAx>
-        <c:axId val="-1133023008"/>
+        <c:axId val="-783095104"/>
         <c:scaling>
           <c:orientation val="minMax"/>
         </c:scaling>
@@ -1667,7 +1668,7 @@
             <a:endParaRPr lang="zh-CN"/>
           </a:p>
         </c:txPr>
-        <c:crossAx val="-1510237264"/>
+        <c:crossAx val="-783091840"/>
         <c:crosses val="autoZero"/>
         <c:auto val="1"/>
         <c:lblAlgn val="ctr"/>
@@ -1675,7 +1676,7 @@
         <c:noMultiLvlLbl val="0"/>
       </c:catAx>
       <c:valAx>
-        <c:axId val="-1510237264"/>
+        <c:axId val="-783091840"/>
         <c:scaling>
           <c:orientation val="minMax"/>
         </c:scaling>
@@ -1726,7 +1727,7 @@
             <a:endParaRPr lang="zh-CN"/>
           </a:p>
         </c:txPr>
-        <c:crossAx val="-1133023008"/>
+        <c:crossAx val="-783095104"/>
         <c:crosses val="autoZero"/>
         <c:crossBetween val="between"/>
       </c:valAx>
@@ -4392,7 +4393,15 @@
           <a:p>
             <a:r>
               <a:rPr lang="zh-CN" altLang="en-US" dirty="0" smtClean="0"/>
-              <a:t>下面是我们的组员</a:t>
+              <a:t>我们</a:t>
+            </a:r>
+            <a:r>
+              <a:rPr lang="zh-CN" altLang="en-US" dirty="0" smtClean="0"/>
+              <a:t>的</a:t>
+            </a:r>
+            <a:r>
+              <a:rPr lang="zh-CN" altLang="en-US" dirty="0" smtClean="0"/>
+              <a:t>组员为</a:t>
             </a:r>
             <a:endParaRPr lang="zh-CN" altLang="en-US" dirty="0"/>
           </a:p>
@@ -4480,20 +4489,19 @@
           </a:bodyPr>
           <a:lstStyle/>
           <a:p>
+            <a:r>
+              <a:rPr lang="zh-CN" altLang="en-US" dirty="0" smtClean="0"/>
+              <a:t>首先，是数据集选择的部分</a:t>
+            </a:r>
             <a:endParaRPr lang="en-US" altLang="zh-CN" dirty="0" smtClean="0"/>
           </a:p>
           <a:p>
-            <a:r>
-              <a:rPr lang="zh-CN" altLang="en-US" dirty="0" smtClean="0"/>
-              <a:t>我们对网络流量进行抓包和重构，获得了</a:t>
-            </a:r>
-            <a:r>
-              <a:rPr lang="en-US" altLang="zh-CN" dirty="0" smtClean="0"/>
-              <a:t>1G</a:t>
-            </a:r>
-            <a:r>
-              <a:rPr lang="zh-CN" altLang="en-US" dirty="0" smtClean="0"/>
-              <a:t>左右的结构化数据</a:t>
+            <a:endParaRPr lang="en-US" altLang="zh-CN" dirty="0" smtClean="0"/>
+          </a:p>
+          <a:p>
+            <a:r>
+              <a:rPr lang="zh-CN" altLang="en-US" dirty="0" smtClean="0"/>
+              <a:t>我们从各种渠道获取了各种数据集</a:t>
             </a:r>
             <a:endParaRPr lang="en-US" altLang="zh-CN" dirty="0" smtClean="0"/>
           </a:p>
@@ -4600,15 +4608,7 @@
           <a:p>
             <a:r>
               <a:rPr lang="zh-CN" altLang="en-US" dirty="0" smtClean="0"/>
-              <a:t>对于结构化的数据，</a:t>
-            </a:r>
-            <a:r>
-              <a:rPr lang="zh-CN" altLang="en-US" dirty="0" smtClean="0"/>
-              <a:t>我们结合不同的应用场景 按增</a:t>
-            </a:r>
-            <a:r>
-              <a:rPr lang="zh-CN" altLang="en-US" dirty="0" smtClean="0"/>
-              <a:t>、查、改的不同比例，分成了五个场景</a:t>
+              <a:t>对于结构化的数据，我们结合不同的应用场景 按增、查、改的不同比例，分成了五个场景</a:t>
             </a:r>
             <a:endParaRPr lang="en-US" altLang="zh-CN" dirty="0" smtClean="0"/>
           </a:p>
@@ -4799,7 +4799,21 @@
             </a:r>
             <a:r>
               <a:rPr lang="zh-CN" altLang="en-US" dirty="0" smtClean="0"/>
-              <a:t>进行监控</a:t>
+              <a:t>进行</a:t>
+            </a:r>
+            <a:r>
+              <a:rPr lang="zh-CN" altLang="en-US" dirty="0" smtClean="0"/>
+              <a:t>监控</a:t>
+            </a:r>
+            <a:endParaRPr lang="en-US" altLang="zh-CN" dirty="0" smtClean="0"/>
+          </a:p>
+          <a:p>
+            <a:endParaRPr lang="en-US" altLang="zh-CN" dirty="0" smtClean="0"/>
+          </a:p>
+          <a:p>
+            <a:r>
+              <a:rPr lang="zh-CN" altLang="en-US" dirty="0" smtClean="0"/>
+              <a:t>然后在运行之前，有一个预热的过程，这是为了防止缓存对数据库读写的影响，所以我们使用一些随即操作对数据库进行了预热</a:t>
             </a:r>
             <a:endParaRPr lang="en-US" altLang="zh-CN" dirty="0" smtClean="0"/>
           </a:p>
@@ -4817,11 +4831,7 @@
             </a:r>
             <a:r>
               <a:rPr lang="zh-CN" altLang="en-US" dirty="0" smtClean="0"/>
-              <a:t>倍的提升</a:t>
-            </a:r>
-            <a:r>
-              <a:rPr lang="zh-CN" altLang="en-US" smtClean="0"/>
-              <a:t>。但是与此同时，读操作的性能受到了一定的影响</a:t>
+              <a:t>倍的提升。但是与此同时，读操作的性能受到了一定的影响</a:t>
             </a:r>
             <a:endParaRPr lang="en-US" altLang="zh-CN" dirty="0" smtClean="0"/>
           </a:p>
@@ -4907,6 +4917,18 @@
           <a:bodyPr/>
           <a:lstStyle/>
           <a:p>
+            <a:r>
+              <a:rPr lang="zh-CN" altLang="en-US" dirty="0" smtClean="0"/>
+              <a:t>首先是万级的数据，可以看到，在数据规模比较小的时候，</a:t>
+            </a:r>
+            <a:r>
+              <a:rPr lang="en-US" altLang="zh-CN" dirty="0" err="1" smtClean="0"/>
+              <a:t>mysql</a:t>
+            </a:r>
+            <a:r>
+              <a:rPr lang="zh-CN" altLang="en-US" dirty="0" smtClean="0"/>
+              <a:t>还是有优势的</a:t>
+            </a:r>
             <a:endParaRPr lang="zh-CN" altLang="en-US" dirty="0"/>
           </a:p>
         </p:txBody>
@@ -4928,7 +4950,7 @@
           <a:p>
             <a:fld id="{B45B17BA-6DD1-4F5E-AAD4-77158B0FD79C}" type="slidenum">
               <a:rPr lang="zh-CN" altLang="en-US" smtClean="0"/>
-              <a:t>14</a:t>
+              <a:t>13</a:t>
             </a:fld>
             <a:endParaRPr lang="zh-CN" altLang="en-US"/>
           </a:p>
@@ -4937,7 +4959,7 @@
     </p:spTree>
     <p:extLst>
       <p:ext uri="{BB962C8B-B14F-4D97-AF65-F5344CB8AC3E}">
-        <p14:creationId xmlns:p14="http://schemas.microsoft.com/office/powerpoint/2010/main" val="2057652356"/>
+        <p14:creationId xmlns:p14="http://schemas.microsoft.com/office/powerpoint/2010/main" val="3744933200"/>
       </p:ext>
     </p:extLst>
   </p:cSld>
@@ -4988,15 +5010,24 @@
         </p:nvSpPr>
         <p:spPr/>
         <p:txBody>
-          <a:bodyPr>
-            <a:normAutofit/>
-          </a:bodyPr>
-          <a:lstStyle/>
-          <a:p>
-            <a:r>
-              <a:rPr lang="zh-CN" altLang="en-US" dirty="0" smtClean="0"/>
-              <a:t>下面是结构化的部分</a:t>
-            </a:r>
+          <a:bodyPr/>
+          <a:lstStyle/>
+          <a:p>
+            <a:r>
+              <a:rPr lang="zh-CN" altLang="en-US" dirty="0" smtClean="0"/>
+              <a:t>但是当数据集增大到的十万的时候，</a:t>
+            </a:r>
+            <a:r>
+              <a:rPr lang="en-US" altLang="zh-CN" dirty="0" err="1" smtClean="0"/>
+              <a:t>mysql</a:t>
+            </a:r>
+            <a:r>
+              <a:rPr lang="zh-CN" altLang="en-US" dirty="0" smtClean="0"/>
+              <a:t>的优势开始缩小</a:t>
+            </a:r>
+            <a:endParaRPr lang="en-US" altLang="zh-CN" dirty="0" smtClean="0"/>
+          </a:p>
+          <a:p>
             <a:endParaRPr lang="zh-CN" altLang="en-US" dirty="0"/>
           </a:p>
         </p:txBody>
@@ -5018,7 +5049,7 @@
           <a:p>
             <a:fld id="{B45B17BA-6DD1-4F5E-AAD4-77158B0FD79C}" type="slidenum">
               <a:rPr lang="zh-CN" altLang="en-US" smtClean="0"/>
-              <a:t>18</a:t>
+              <a:t>14</a:t>
             </a:fld>
             <a:endParaRPr lang="zh-CN" altLang="en-US"/>
           </a:p>
@@ -5027,7 +5058,7 @@
     </p:spTree>
     <p:extLst>
       <p:ext uri="{BB962C8B-B14F-4D97-AF65-F5344CB8AC3E}">
-        <p14:creationId xmlns:p14="http://schemas.microsoft.com/office/powerpoint/2010/main" val="422907835"/>
+        <p14:creationId xmlns:p14="http://schemas.microsoft.com/office/powerpoint/2010/main" val="2057652356"/>
       </p:ext>
     </p:extLst>
   </p:cSld>
@@ -5078,82 +5109,50 @@
         </p:nvSpPr>
         <p:spPr/>
         <p:txBody>
-          <a:bodyPr>
-            <a:normAutofit/>
-          </a:bodyPr>
-          <a:lstStyle/>
-          <a:p>
-            <a:r>
-              <a:rPr lang="zh-CN" altLang="en-US" dirty="0" smtClean="0"/>
-              <a:t>对于非结构数据，经过我们的多方考虑，最后决定使用</a:t>
-            </a:r>
-            <a:r>
-              <a:rPr lang="en-US" altLang="zh-CN" dirty="0" smtClean="0"/>
-              <a:t>html</a:t>
-            </a:r>
-            <a:r>
-              <a:rPr lang="zh-CN" altLang="en-US" dirty="0" smtClean="0"/>
-              <a:t>来作为我们的数据集</a:t>
+          <a:bodyPr/>
+          <a:lstStyle/>
+          <a:p>
+            <a:r>
+              <a:rPr lang="zh-CN" altLang="en-US" dirty="0" smtClean="0"/>
+              <a:t>到百万级的时候，</a:t>
+            </a:r>
+            <a:r>
+              <a:rPr lang="en-US" altLang="zh-CN" dirty="0" err="1" smtClean="0"/>
+              <a:t>mongodb</a:t>
+            </a:r>
+            <a:r>
+              <a:rPr lang="zh-CN" altLang="en-US" dirty="0" smtClean="0"/>
+              <a:t>的速度已经远远超过</a:t>
+            </a:r>
+            <a:r>
+              <a:rPr lang="en-US" altLang="zh-CN" dirty="0" err="1" smtClean="0"/>
+              <a:t>mysql</a:t>
             </a:r>
             <a:endParaRPr lang="en-US" altLang="zh-CN" dirty="0" smtClean="0"/>
           </a:p>
           <a:p>
-            <a:r>
-              <a:rPr lang="zh-CN" altLang="en-US" dirty="0" smtClean="0"/>
-              <a:t>我们对交大教务处的网页进行了爬取，</a:t>
-            </a:r>
             <a:endParaRPr lang="en-US" altLang="zh-CN" dirty="0" smtClean="0"/>
           </a:p>
           <a:p>
             <a:r>
               <a:rPr lang="zh-CN" altLang="en-US" dirty="0" smtClean="0"/>
-              <a:t>因为完成这次大作业的时间有限，我们最后使用了其中的一万条数据作为我们的测试数据集</a:t>
+              <a:t>那么</a:t>
+            </a:r>
+            <a:r>
+              <a:rPr lang="en-US" altLang="zh-CN" dirty="0" err="1" smtClean="0"/>
+              <a:t>mongodb</a:t>
+            </a:r>
+            <a:r>
+              <a:rPr lang="zh-CN" altLang="en-US" dirty="0" smtClean="0"/>
+              <a:t>为什么会这么快呢</a:t>
             </a:r>
             <a:endParaRPr lang="en-US" altLang="zh-CN" dirty="0" smtClean="0"/>
           </a:p>
           <a:p>
             <a:r>
-              <a:rPr lang="en-US" altLang="zh-CN" dirty="0" err="1" smtClean="0"/>
-              <a:t>nosql</a:t>
-            </a:r>
-            <a:r>
-              <a:rPr lang="zh-CN" altLang="en-US" dirty="0" smtClean="0"/>
-              <a:t>方面，我们编写了程序把</a:t>
-            </a:r>
-            <a:r>
-              <a:rPr lang="en-US" altLang="zh-CN" dirty="0" smtClean="0"/>
-              <a:t>html</a:t>
-            </a:r>
-            <a:r>
-              <a:rPr lang="zh-CN" altLang="en-US" dirty="0" smtClean="0"/>
-              <a:t>转换为</a:t>
-            </a:r>
-            <a:r>
-              <a:rPr lang="en-US" altLang="zh-CN" dirty="0" err="1" smtClean="0"/>
-              <a:t>json</a:t>
-            </a:r>
-            <a:endParaRPr lang="en-US" altLang="zh-CN" dirty="0" smtClean="0"/>
-          </a:p>
-          <a:p>
-            <a:r>
-              <a:rPr lang="en-US" altLang="zh-CN" dirty="0" err="1" smtClean="0"/>
-              <a:t>Sql</a:t>
-            </a:r>
-            <a:r>
-              <a:rPr lang="zh-CN" altLang="en-US" dirty="0" smtClean="0"/>
-              <a:t>方面，我们把</a:t>
-            </a:r>
-            <a:r>
-              <a:rPr lang="en-US" altLang="zh-CN" dirty="0" smtClean="0"/>
-              <a:t>html</a:t>
-            </a:r>
-            <a:r>
-              <a:rPr lang="zh-CN" altLang="en-US" dirty="0" smtClean="0"/>
-              <a:t>转化为了以下的格式</a:t>
-            </a:r>
-            <a:endParaRPr lang="en-US" altLang="zh-CN" dirty="0" smtClean="0"/>
-          </a:p>
-          <a:p>
+              <a:rPr lang="zh-CN" altLang="en-US" dirty="0" smtClean="0"/>
+              <a:t>我想大家看了下一张图就明白了</a:t>
+            </a:r>
             <a:endParaRPr lang="en-US" altLang="zh-CN" dirty="0" smtClean="0"/>
           </a:p>
         </p:txBody>
@@ -5175,7 +5174,7 @@
           <a:p>
             <a:fld id="{B45B17BA-6DD1-4F5E-AAD4-77158B0FD79C}" type="slidenum">
               <a:rPr lang="zh-CN" altLang="en-US" smtClean="0"/>
-              <a:t>19</a:t>
+              <a:t>15</a:t>
             </a:fld>
             <a:endParaRPr lang="zh-CN" altLang="en-US"/>
           </a:p>
@@ -5184,7 +5183,7 @@
     </p:spTree>
     <p:extLst>
       <p:ext uri="{BB962C8B-B14F-4D97-AF65-F5344CB8AC3E}">
-        <p14:creationId xmlns:p14="http://schemas.microsoft.com/office/powerpoint/2010/main" val="265750665"/>
+        <p14:creationId xmlns:p14="http://schemas.microsoft.com/office/powerpoint/2010/main" val="3005926550"/>
       </p:ext>
     </p:extLst>
   </p:cSld>
@@ -5235,86 +5234,43 @@
         </p:nvSpPr>
         <p:spPr/>
         <p:txBody>
-          <a:bodyPr>
-            <a:normAutofit/>
-          </a:bodyPr>
-          <a:lstStyle/>
-          <a:p>
-            <a:r>
-              <a:rPr lang="zh-CN" altLang="en-US" dirty="0" smtClean="0"/>
-              <a:t>在这里，我们假设的场景为类似百度快照的应用</a:t>
+          <a:bodyPr/>
+          <a:lstStyle/>
+          <a:p>
+            <a:r>
+              <a:rPr lang="zh-CN" altLang="en-US" dirty="0" smtClean="0"/>
+              <a:t>是的，</a:t>
+            </a:r>
+            <a:r>
+              <a:rPr lang="en-US" altLang="zh-CN" dirty="0" smtClean="0"/>
+              <a:t>MongoDB</a:t>
+            </a:r>
+            <a:r>
+              <a:rPr lang="zh-CN" altLang="en-US" dirty="0" smtClean="0"/>
+              <a:t>的空间占用几乎达到了</a:t>
+            </a:r>
+            <a:r>
+              <a:rPr lang="en-US" altLang="zh-CN" dirty="0" smtClean="0"/>
+              <a:t>MySQL</a:t>
+            </a:r>
+            <a:r>
+              <a:rPr lang="zh-CN" altLang="en-US" dirty="0" smtClean="0"/>
+              <a:t>的三倍</a:t>
             </a:r>
             <a:endParaRPr lang="en-US" altLang="zh-CN" dirty="0" smtClean="0"/>
           </a:p>
           <a:p>
             <a:r>
               <a:rPr lang="zh-CN" altLang="en-US" dirty="0" smtClean="0"/>
-              <a:t>我们需要通过数据库快速的还原应用</a:t>
-            </a:r>
-            <a:endParaRPr lang="en-US" altLang="zh-CN" dirty="0" smtClean="0"/>
-          </a:p>
-          <a:p>
-            <a:r>
-              <a:rPr lang="en-US" altLang="zh-CN" dirty="0" err="1" smtClean="0"/>
-              <a:t>Sql</a:t>
-            </a:r>
-            <a:r>
-              <a:rPr lang="zh-CN" altLang="en-US" dirty="0" smtClean="0"/>
-              <a:t>实现该应用需要十分复杂的</a:t>
-            </a:r>
-            <a:r>
-              <a:rPr lang="en-US" altLang="zh-CN" dirty="0" err="1" smtClean="0"/>
-              <a:t>sql</a:t>
-            </a:r>
-            <a:r>
-              <a:rPr lang="zh-CN" altLang="en-US" dirty="0" smtClean="0"/>
-              <a:t>语句</a:t>
-            </a:r>
-            <a:endParaRPr lang="en-US" altLang="zh-CN" dirty="0" smtClean="0"/>
-          </a:p>
-          <a:p>
-            <a:r>
-              <a:rPr lang="zh-CN" altLang="en-US" dirty="0" smtClean="0"/>
-              <a:t>而与此同时，</a:t>
-            </a:r>
-            <a:r>
-              <a:rPr lang="en-US" altLang="zh-CN" dirty="0" err="1" smtClean="0"/>
-              <a:t>nosql</a:t>
-            </a:r>
-            <a:r>
-              <a:rPr lang="zh-CN" altLang="en-US" dirty="0" smtClean="0"/>
-              <a:t>只需要提取出简单的</a:t>
-            </a:r>
-            <a:r>
-              <a:rPr lang="en-US" altLang="zh-CN" dirty="0" err="1" smtClean="0"/>
-              <a:t>json</a:t>
-            </a:r>
-            <a:r>
-              <a:rPr lang="zh-CN" altLang="en-US" dirty="0" smtClean="0"/>
-              <a:t>就可实现该功能</a:t>
-            </a:r>
-            <a:endParaRPr lang="en-US" altLang="zh-CN" dirty="0" smtClean="0"/>
-          </a:p>
-          <a:p>
-            <a:r>
-              <a:rPr lang="zh-CN" altLang="en-US" dirty="0" smtClean="0"/>
-              <a:t>在这里可以看到，</a:t>
-            </a:r>
-            <a:r>
-              <a:rPr lang="en-US" altLang="zh-CN" dirty="0" err="1" smtClean="0"/>
-              <a:t>nosql</a:t>
-            </a:r>
-            <a:r>
-              <a:rPr lang="zh-CN" altLang="en-US" dirty="0" smtClean="0"/>
-              <a:t>相对于</a:t>
-            </a:r>
-            <a:r>
-              <a:rPr lang="en-US" altLang="zh-CN" dirty="0" err="1" smtClean="0"/>
-              <a:t>mysql</a:t>
-            </a:r>
-            <a:r>
-              <a:rPr lang="zh-CN" altLang="en-US" dirty="0" smtClean="0"/>
-              <a:t>有极大的优势</a:t>
+              <a:t>这样看来，</a:t>
+            </a:r>
+            <a:r>
+              <a:rPr lang="en-US" altLang="zh-CN" dirty="0" smtClean="0"/>
+              <a:t>MongoDB</a:t>
+            </a:r>
+            <a:r>
+              <a:rPr lang="zh-CN" altLang="en-US" dirty="0" smtClean="0"/>
+              <a:t>的高速是以巨大的空间占用来实现的</a:t>
             </a:r>
             <a:endParaRPr lang="zh-CN" altLang="en-US" dirty="0"/>
           </a:p>
@@ -5337,7 +5293,7 @@
           <a:p>
             <a:fld id="{B45B17BA-6DD1-4F5E-AAD4-77158B0FD79C}" type="slidenum">
               <a:rPr lang="zh-CN" altLang="en-US" smtClean="0"/>
-              <a:t>21</a:t>
+              <a:t>16</a:t>
             </a:fld>
             <a:endParaRPr lang="zh-CN" altLang="en-US"/>
           </a:p>
@@ -5346,7 +5302,7 @@
     </p:spTree>
     <p:extLst>
       <p:ext uri="{BB962C8B-B14F-4D97-AF65-F5344CB8AC3E}">
-        <p14:creationId xmlns:p14="http://schemas.microsoft.com/office/powerpoint/2010/main" val="1724076446"/>
+        <p14:creationId xmlns:p14="http://schemas.microsoft.com/office/powerpoint/2010/main" val="1452888761"/>
       </p:ext>
     </p:extLst>
   </p:cSld>
@@ -5397,9 +5353,15 @@
         </p:nvSpPr>
         <p:spPr/>
         <p:txBody>
-          <a:bodyPr/>
-          <a:lstStyle/>
-          <a:p>
+          <a:bodyPr>
+            <a:normAutofit/>
+          </a:bodyPr>
+          <a:lstStyle/>
+          <a:p>
+            <a:r>
+              <a:rPr lang="zh-CN" altLang="en-US" dirty="0" smtClean="0"/>
+              <a:t>下面是结构化的部分</a:t>
+            </a:r>
             <a:endParaRPr lang="zh-CN" altLang="en-US" dirty="0"/>
           </a:p>
         </p:txBody>
@@ -5421,7 +5383,7 @@
           <a:p>
             <a:fld id="{B45B17BA-6DD1-4F5E-AAD4-77158B0FD79C}" type="slidenum">
               <a:rPr lang="zh-CN" altLang="en-US" smtClean="0"/>
-              <a:t>24</a:t>
+              <a:t>18</a:t>
             </a:fld>
             <a:endParaRPr lang="zh-CN" altLang="en-US"/>
           </a:p>
@@ -5430,7 +5392,7 @@
     </p:spTree>
     <p:extLst>
       <p:ext uri="{BB962C8B-B14F-4D97-AF65-F5344CB8AC3E}">
-        <p14:creationId xmlns:p14="http://schemas.microsoft.com/office/powerpoint/2010/main" val="1778141679"/>
+        <p14:creationId xmlns:p14="http://schemas.microsoft.com/office/powerpoint/2010/main" val="422907835"/>
       </p:ext>
     </p:extLst>
   </p:cSld>
@@ -5488,9 +5450,76 @@
           <a:p>
             <a:r>
               <a:rPr lang="zh-CN" altLang="en-US" dirty="0" smtClean="0"/>
-              <a:t>以下是我们的参考文献</a:t>
-            </a:r>
-            <a:endParaRPr lang="zh-CN" altLang="en-US" dirty="0"/>
+              <a:t>对于非结构数据，经过我们的多方考虑，最后决定使用</a:t>
+            </a:r>
+            <a:r>
+              <a:rPr lang="en-US" altLang="zh-CN" dirty="0" smtClean="0"/>
+              <a:t>html</a:t>
+            </a:r>
+            <a:r>
+              <a:rPr lang="zh-CN" altLang="en-US" dirty="0" smtClean="0"/>
+              <a:t>来作为我们的数据集</a:t>
+            </a:r>
+            <a:endParaRPr lang="en-US" altLang="zh-CN" dirty="0" smtClean="0"/>
+          </a:p>
+          <a:p>
+            <a:r>
+              <a:rPr lang="zh-CN" altLang="en-US" dirty="0" smtClean="0"/>
+              <a:t>我们对交大教务处的网页进行了爬取，</a:t>
+            </a:r>
+            <a:endParaRPr lang="en-US" altLang="zh-CN" dirty="0" smtClean="0"/>
+          </a:p>
+          <a:p>
+            <a:r>
+              <a:rPr lang="zh-CN" altLang="en-US" dirty="0" smtClean="0"/>
+              <a:t>因为完成这次大作业的时间有限，我们最后使用了其中的一万条数据作为我们的测试数据集</a:t>
+            </a:r>
+            <a:endParaRPr lang="en-US" altLang="zh-CN" dirty="0" smtClean="0"/>
+          </a:p>
+          <a:p>
+            <a:r>
+              <a:rPr lang="en-US" altLang="zh-CN" dirty="0" err="1" smtClean="0"/>
+              <a:t>nosql</a:t>
+            </a:r>
+            <a:r>
+              <a:rPr lang="zh-CN" altLang="en-US" dirty="0" smtClean="0"/>
+              <a:t>方面，我们编写了程序把</a:t>
+            </a:r>
+            <a:r>
+              <a:rPr lang="en-US" altLang="zh-CN" dirty="0" smtClean="0"/>
+              <a:t>html</a:t>
+            </a:r>
+            <a:r>
+              <a:rPr lang="zh-CN" altLang="en-US" dirty="0" smtClean="0"/>
+              <a:t>转换为</a:t>
+            </a:r>
+            <a:r>
+              <a:rPr lang="en-US" altLang="zh-CN" dirty="0" err="1" smtClean="0"/>
+              <a:t>json</a:t>
+            </a:r>
+            <a:endParaRPr lang="en-US" altLang="zh-CN" dirty="0" smtClean="0"/>
+          </a:p>
+          <a:p>
+            <a:r>
+              <a:rPr lang="en-US" altLang="zh-CN" dirty="0" err="1" smtClean="0"/>
+              <a:t>Sql</a:t>
+            </a:r>
+            <a:r>
+              <a:rPr lang="zh-CN" altLang="en-US" dirty="0" smtClean="0"/>
+              <a:t>方面，我们把</a:t>
+            </a:r>
+            <a:r>
+              <a:rPr lang="en-US" altLang="zh-CN" dirty="0" smtClean="0"/>
+              <a:t>html</a:t>
+            </a:r>
+            <a:r>
+              <a:rPr lang="zh-CN" altLang="en-US" dirty="0" smtClean="0"/>
+              <a:t>转化为了以下的格式</a:t>
+            </a:r>
+            <a:endParaRPr lang="en-US" altLang="zh-CN" dirty="0" smtClean="0"/>
+          </a:p>
+          <a:p>
+            <a:endParaRPr lang="en-US" altLang="zh-CN" dirty="0" smtClean="0"/>
           </a:p>
         </p:txBody>
       </p:sp>
@@ -5511,7 +5540,7 @@
           <a:p>
             <a:fld id="{B45B17BA-6DD1-4F5E-AAD4-77158B0FD79C}" type="slidenum">
               <a:rPr lang="zh-CN" altLang="en-US" smtClean="0"/>
-              <a:t>25</a:t>
+              <a:t>19</a:t>
             </a:fld>
             <a:endParaRPr lang="zh-CN" altLang="en-US"/>
           </a:p>
@@ -5520,7 +5549,7 @@
     </p:spTree>
     <p:extLst>
       <p:ext uri="{BB962C8B-B14F-4D97-AF65-F5344CB8AC3E}">
-        <p14:creationId xmlns:p14="http://schemas.microsoft.com/office/powerpoint/2010/main" val="1987613371"/>
+        <p14:creationId xmlns:p14="http://schemas.microsoft.com/office/powerpoint/2010/main" val="265750665"/>
       </p:ext>
     </p:extLst>
   </p:cSld>
@@ -5578,41 +5607,79 @@
           <a:p>
             <a:r>
               <a:rPr lang="zh-CN" altLang="en-US" dirty="0" smtClean="0"/>
-              <a:t>我们的研究和实验还有很多不足的地方</a:t>
+              <a:t>在这里，我们假设的场景为类似百度快照的应用</a:t>
             </a:r>
             <a:endParaRPr lang="en-US" altLang="zh-CN" dirty="0" smtClean="0"/>
           </a:p>
           <a:p>
             <a:r>
               <a:rPr lang="zh-CN" altLang="en-US" dirty="0" smtClean="0"/>
-              <a:t>所以我们把相关的材料，程序</a:t>
-            </a:r>
-            <a:r>
-              <a:rPr lang="en-US" altLang="zh-CN" dirty="0" smtClean="0"/>
-              <a:t>/</a:t>
-            </a:r>
-            <a:r>
-              <a:rPr lang="zh-CN" altLang="en-US" dirty="0" smtClean="0"/>
-              <a:t>脚本的源代码都放到了</a:t>
-            </a:r>
+              <a:t>我们需要通过数据库快速的还原应用</a:t>
+            </a:r>
+            <a:endParaRPr lang="en-US" altLang="zh-CN" dirty="0" smtClean="0"/>
+          </a:p>
+          <a:p>
             <a:r>
               <a:rPr lang="en-US" altLang="zh-CN" dirty="0" err="1" smtClean="0"/>
-              <a:t>github</a:t>
-            </a:r>
-            <a:r>
-              <a:rPr lang="zh-CN" altLang="en-US" dirty="0" smtClean="0"/>
-              <a:t>上，大家可以通过扫描这个二维码查看我们的项目</a:t>
+              <a:t>Sql</a:t>
+            </a:r>
+            <a:r>
+              <a:rPr lang="zh-CN" altLang="en-US" dirty="0" smtClean="0"/>
+              <a:t>实现该应用需要十分复杂的</a:t>
+            </a:r>
+            <a:r>
+              <a:rPr lang="en-US" altLang="zh-CN" dirty="0" err="1" smtClean="0"/>
+              <a:t>sql</a:t>
+            </a:r>
+            <a:r>
+              <a:rPr lang="zh-CN" altLang="en-US" dirty="0" smtClean="0"/>
+              <a:t>语句</a:t>
             </a:r>
             <a:endParaRPr lang="en-US" altLang="zh-CN" dirty="0" smtClean="0"/>
           </a:p>
           <a:p>
             <a:r>
               <a:rPr lang="zh-CN" altLang="en-US" dirty="0" smtClean="0"/>
-              <a:t>欢迎大家对我们的项目</a:t>
-            </a:r>
-            <a:r>
-              <a:rPr lang="en-US" altLang="zh-CN" dirty="0" smtClean="0"/>
-              <a:t>commit</a:t>
+              <a:t>而与此同时，</a:t>
+            </a:r>
+            <a:r>
+              <a:rPr lang="en-US" altLang="zh-CN" dirty="0" err="1" smtClean="0"/>
+              <a:t>nosql</a:t>
+            </a:r>
+            <a:r>
+              <a:rPr lang="zh-CN" altLang="en-US" dirty="0" smtClean="0"/>
+              <a:t>只需要提取出简单的</a:t>
+            </a:r>
+            <a:r>
+              <a:rPr lang="en-US" altLang="zh-CN" dirty="0" err="1" smtClean="0"/>
+              <a:t>json</a:t>
+            </a:r>
+            <a:r>
+              <a:rPr lang="zh-CN" altLang="en-US" dirty="0" smtClean="0"/>
+              <a:t>就可实现该功能</a:t>
+            </a:r>
+            <a:endParaRPr lang="en-US" altLang="zh-CN" dirty="0" smtClean="0"/>
+          </a:p>
+          <a:p>
+            <a:r>
+              <a:rPr lang="zh-CN" altLang="en-US" dirty="0" smtClean="0"/>
+              <a:t>在这里可以看到，</a:t>
+            </a:r>
+            <a:r>
+              <a:rPr lang="en-US" altLang="zh-CN" dirty="0" err="1" smtClean="0"/>
+              <a:t>nosql</a:t>
+            </a:r>
+            <a:r>
+              <a:rPr lang="zh-CN" altLang="en-US" dirty="0" smtClean="0"/>
+              <a:t>相对于</a:t>
+            </a:r>
+            <a:r>
+              <a:rPr lang="en-US" altLang="zh-CN" dirty="0" err="1" smtClean="0"/>
+              <a:t>mysql</a:t>
+            </a:r>
+            <a:r>
+              <a:rPr lang="zh-CN" altLang="en-US" dirty="0" smtClean="0"/>
+              <a:t>有极大的优势</a:t>
             </a:r>
             <a:endParaRPr lang="zh-CN" altLang="en-US" dirty="0"/>
           </a:p>
@@ -5635,7 +5702,7 @@
           <a:p>
             <a:fld id="{B45B17BA-6DD1-4F5E-AAD4-77158B0FD79C}" type="slidenum">
               <a:rPr lang="zh-CN" altLang="en-US" smtClean="0"/>
-              <a:t>26</a:t>
+              <a:t>22</a:t>
             </a:fld>
             <a:endParaRPr lang="zh-CN" altLang="en-US"/>
           </a:p>
@@ -5644,7 +5711,7 @@
     </p:spTree>
     <p:extLst>
       <p:ext uri="{BB962C8B-B14F-4D97-AF65-F5344CB8AC3E}">
-        <p14:creationId xmlns:p14="http://schemas.microsoft.com/office/powerpoint/2010/main" val="1556724422"/>
+        <p14:creationId xmlns:p14="http://schemas.microsoft.com/office/powerpoint/2010/main" val="1724076446"/>
       </p:ext>
     </p:extLst>
   </p:cSld>
@@ -5702,15 +5769,11 @@
           <a:p>
             <a:r>
               <a:rPr lang="zh-CN" altLang="en-US" dirty="0" smtClean="0"/>
-              <a:t>首先，请允许我简单介绍一下数据库在</a:t>
-            </a:r>
-            <a:r>
-              <a:rPr lang="en-US" altLang="zh-CN" dirty="0" err="1" smtClean="0"/>
-              <a:t>sql</a:t>
-            </a:r>
-            <a:r>
-              <a:rPr lang="zh-CN" altLang="en-US" dirty="0" smtClean="0"/>
-              <a:t>出现以后的历史</a:t>
+              <a:t>首先，请允许</a:t>
+            </a:r>
+            <a:r>
+              <a:rPr lang="zh-CN" altLang="en-US" dirty="0" smtClean="0"/>
+              <a:t>我对背景做一下简单介绍</a:t>
             </a:r>
             <a:endParaRPr lang="zh-CN" altLang="en-US" dirty="0"/>
           </a:p>
@@ -5743,6 +5806,342 @@
     <p:extLst>
       <p:ext uri="{BB962C8B-B14F-4D97-AF65-F5344CB8AC3E}">
         <p14:creationId xmlns:p14="http://schemas.microsoft.com/office/powerpoint/2010/main" val="1159521242"/>
+      </p:ext>
+    </p:extLst>
+  </p:cSld>
+  <p:clrMapOvr>
+    <a:masterClrMapping/>
+  </p:clrMapOvr>
+</p:notes>
+</file>
+
+<file path=ppt/notesSlides/notesSlide20.xml><?xml version="1.0" encoding="utf-8"?>
+<p:notes xmlns:a="http://schemas.openxmlformats.org/drawingml/2006/main" xmlns:r="http://schemas.openxmlformats.org/officeDocument/2006/relationships" xmlns:p="http://schemas.openxmlformats.org/presentationml/2006/main">
+  <p:cSld>
+    <p:spTree>
+      <p:nvGrpSpPr>
+        <p:cNvPr id="1" name=""/>
+        <p:cNvGrpSpPr/>
+        <p:nvPr/>
+      </p:nvGrpSpPr>
+      <p:grpSpPr>
+        <a:xfrm>
+          <a:off x="0" y="0"/>
+          <a:ext cx="0" cy="0"/>
+          <a:chOff x="0" y="0"/>
+          <a:chExt cx="0" cy="0"/>
+        </a:xfrm>
+      </p:grpSpPr>
+      <p:sp>
+        <p:nvSpPr>
+          <p:cNvPr id="2" name="幻灯片图像占位符 1"/>
+          <p:cNvSpPr>
+            <a:spLocks noGrp="1" noRot="1" noChangeAspect="1"/>
+          </p:cNvSpPr>
+          <p:nvPr>
+            <p:ph type="sldImg"/>
+          </p:nvPr>
+        </p:nvSpPr>
+        <p:spPr/>
+      </p:sp>
+      <p:sp>
+        <p:nvSpPr>
+          <p:cNvPr id="3" name="备注占位符 2"/>
+          <p:cNvSpPr>
+            <a:spLocks noGrp="1"/>
+          </p:cNvSpPr>
+          <p:nvPr>
+            <p:ph type="body" idx="1"/>
+          </p:nvPr>
+        </p:nvSpPr>
+        <p:spPr/>
+        <p:txBody>
+          <a:bodyPr/>
+          <a:lstStyle/>
+          <a:p>
+            <a:r>
+              <a:rPr lang="zh-CN" altLang="en-US" dirty="0" smtClean="0"/>
+              <a:t>正如前言，</a:t>
+            </a:r>
+            <a:r>
+              <a:rPr lang="en-US" altLang="zh-CN" dirty="0" smtClean="0"/>
+              <a:t>MySQL</a:t>
+            </a:r>
+            <a:r>
+              <a:rPr lang="zh-CN" altLang="en-US" dirty="0" smtClean="0"/>
+              <a:t>在处理结构化的数据上有一定的优势，但是，</a:t>
+            </a:r>
+            <a:endParaRPr lang="en-US" altLang="zh-CN" dirty="0" smtClean="0"/>
+          </a:p>
+          <a:p>
+            <a:r>
+              <a:rPr lang="zh-CN" altLang="en-US" dirty="0" smtClean="0"/>
+              <a:t>随着应用场景的不断多元化，</a:t>
+            </a:r>
+            <a:r>
+              <a:rPr lang="en-US" altLang="zh-CN" dirty="0" smtClean="0"/>
+              <a:t>NoSQL</a:t>
+            </a:r>
+            <a:r>
+              <a:rPr lang="zh-CN" altLang="en-US" dirty="0" smtClean="0"/>
+              <a:t>或许会成为一些应用的很好的选择</a:t>
+            </a:r>
+            <a:endParaRPr lang="en-US" altLang="zh-CN" dirty="0" smtClean="0"/>
+          </a:p>
+        </p:txBody>
+      </p:sp>
+      <p:sp>
+        <p:nvSpPr>
+          <p:cNvPr id="4" name="灯片编号占位符 3"/>
+          <p:cNvSpPr>
+            <a:spLocks noGrp="1"/>
+          </p:cNvSpPr>
+          <p:nvPr>
+            <p:ph type="sldNum" sz="quarter" idx="10"/>
+          </p:nvPr>
+        </p:nvSpPr>
+        <p:spPr/>
+        <p:txBody>
+          <a:bodyPr/>
+          <a:lstStyle/>
+          <a:p>
+            <a:fld id="{B45B17BA-6DD1-4F5E-AAD4-77158B0FD79C}" type="slidenum">
+              <a:rPr lang="zh-CN" altLang="en-US" smtClean="0"/>
+              <a:t>25</a:t>
+            </a:fld>
+            <a:endParaRPr lang="zh-CN" altLang="en-US"/>
+          </a:p>
+        </p:txBody>
+      </p:sp>
+    </p:spTree>
+    <p:extLst>
+      <p:ext uri="{BB962C8B-B14F-4D97-AF65-F5344CB8AC3E}">
+        <p14:creationId xmlns:p14="http://schemas.microsoft.com/office/powerpoint/2010/main" val="1778141679"/>
+      </p:ext>
+    </p:extLst>
+  </p:cSld>
+  <p:clrMapOvr>
+    <a:masterClrMapping/>
+  </p:clrMapOvr>
+</p:notes>
+</file>
+
+<file path=ppt/notesSlides/notesSlide21.xml><?xml version="1.0" encoding="utf-8"?>
+<p:notes xmlns:a="http://schemas.openxmlformats.org/drawingml/2006/main" xmlns:r="http://schemas.openxmlformats.org/officeDocument/2006/relationships" xmlns:p="http://schemas.openxmlformats.org/presentationml/2006/main">
+  <p:cSld>
+    <p:spTree>
+      <p:nvGrpSpPr>
+        <p:cNvPr id="1" name=""/>
+        <p:cNvGrpSpPr/>
+        <p:nvPr/>
+      </p:nvGrpSpPr>
+      <p:grpSpPr>
+        <a:xfrm>
+          <a:off x="0" y="0"/>
+          <a:ext cx="0" cy="0"/>
+          <a:chOff x="0" y="0"/>
+          <a:chExt cx="0" cy="0"/>
+        </a:xfrm>
+      </p:grpSpPr>
+      <p:sp>
+        <p:nvSpPr>
+          <p:cNvPr id="2" name="幻灯片图像占位符 1"/>
+          <p:cNvSpPr>
+            <a:spLocks noGrp="1" noRot="1" noChangeAspect="1"/>
+          </p:cNvSpPr>
+          <p:nvPr>
+            <p:ph type="sldImg"/>
+          </p:nvPr>
+        </p:nvSpPr>
+        <p:spPr/>
+      </p:sp>
+      <p:sp>
+        <p:nvSpPr>
+          <p:cNvPr id="3" name="备注占位符 2"/>
+          <p:cNvSpPr>
+            <a:spLocks noGrp="1"/>
+          </p:cNvSpPr>
+          <p:nvPr>
+            <p:ph type="body" idx="1"/>
+          </p:nvPr>
+        </p:nvSpPr>
+        <p:spPr/>
+        <p:txBody>
+          <a:bodyPr>
+            <a:normAutofit/>
+          </a:bodyPr>
+          <a:lstStyle/>
+          <a:p>
+            <a:r>
+              <a:rPr lang="zh-CN" altLang="en-US" dirty="0" smtClean="0"/>
+              <a:t>以下是我们的参考文献</a:t>
+            </a:r>
+            <a:endParaRPr lang="zh-CN" altLang="en-US" dirty="0"/>
+          </a:p>
+        </p:txBody>
+      </p:sp>
+      <p:sp>
+        <p:nvSpPr>
+          <p:cNvPr id="4" name="灯片编号占位符 3"/>
+          <p:cNvSpPr>
+            <a:spLocks noGrp="1"/>
+          </p:cNvSpPr>
+          <p:nvPr>
+            <p:ph type="sldNum" sz="quarter" idx="10"/>
+          </p:nvPr>
+        </p:nvSpPr>
+        <p:spPr/>
+        <p:txBody>
+          <a:bodyPr/>
+          <a:lstStyle/>
+          <a:p>
+            <a:fld id="{B45B17BA-6DD1-4F5E-AAD4-77158B0FD79C}" type="slidenum">
+              <a:rPr lang="zh-CN" altLang="en-US" smtClean="0"/>
+              <a:t>26</a:t>
+            </a:fld>
+            <a:endParaRPr lang="zh-CN" altLang="en-US"/>
+          </a:p>
+        </p:txBody>
+      </p:sp>
+    </p:spTree>
+    <p:extLst>
+      <p:ext uri="{BB962C8B-B14F-4D97-AF65-F5344CB8AC3E}">
+        <p14:creationId xmlns:p14="http://schemas.microsoft.com/office/powerpoint/2010/main" val="1987613371"/>
+      </p:ext>
+    </p:extLst>
+  </p:cSld>
+  <p:clrMapOvr>
+    <a:masterClrMapping/>
+  </p:clrMapOvr>
+</p:notes>
+</file>
+
+<file path=ppt/notesSlides/notesSlide22.xml><?xml version="1.0" encoding="utf-8"?>
+<p:notes xmlns:a="http://schemas.openxmlformats.org/drawingml/2006/main" xmlns:r="http://schemas.openxmlformats.org/officeDocument/2006/relationships" xmlns:p="http://schemas.openxmlformats.org/presentationml/2006/main">
+  <p:cSld>
+    <p:spTree>
+      <p:nvGrpSpPr>
+        <p:cNvPr id="1" name=""/>
+        <p:cNvGrpSpPr/>
+        <p:nvPr/>
+      </p:nvGrpSpPr>
+      <p:grpSpPr>
+        <a:xfrm>
+          <a:off x="0" y="0"/>
+          <a:ext cx="0" cy="0"/>
+          <a:chOff x="0" y="0"/>
+          <a:chExt cx="0" cy="0"/>
+        </a:xfrm>
+      </p:grpSpPr>
+      <p:sp>
+        <p:nvSpPr>
+          <p:cNvPr id="2" name="幻灯片图像占位符 1"/>
+          <p:cNvSpPr>
+            <a:spLocks noGrp="1" noRot="1" noChangeAspect="1"/>
+          </p:cNvSpPr>
+          <p:nvPr>
+            <p:ph type="sldImg"/>
+          </p:nvPr>
+        </p:nvSpPr>
+        <p:spPr/>
+      </p:sp>
+      <p:sp>
+        <p:nvSpPr>
+          <p:cNvPr id="3" name="备注占位符 2"/>
+          <p:cNvSpPr>
+            <a:spLocks noGrp="1"/>
+          </p:cNvSpPr>
+          <p:nvPr>
+            <p:ph type="body" idx="1"/>
+          </p:nvPr>
+        </p:nvSpPr>
+        <p:spPr/>
+        <p:txBody>
+          <a:bodyPr>
+            <a:normAutofit/>
+          </a:bodyPr>
+          <a:lstStyle/>
+          <a:p>
+            <a:r>
+              <a:rPr lang="zh-CN" altLang="en-US" dirty="0" smtClean="0"/>
+              <a:t>因为时间有限，我们并没有把我们整个实验展现出来，</a:t>
+            </a:r>
+            <a:endParaRPr lang="en-US" altLang="zh-CN" dirty="0" smtClean="0"/>
+          </a:p>
+          <a:p>
+            <a:r>
+              <a:rPr lang="zh-CN" altLang="en-US" dirty="0" smtClean="0"/>
+              <a:t>另外，我们的研究和实验还有很多不足的地方</a:t>
+            </a:r>
+            <a:endParaRPr lang="en-US" altLang="zh-CN" dirty="0" smtClean="0"/>
+          </a:p>
+          <a:p>
+            <a:r>
+              <a:rPr lang="zh-CN" altLang="en-US" dirty="0" smtClean="0"/>
+              <a:t>所以</a:t>
+            </a:r>
+            <a:r>
+              <a:rPr lang="zh-CN" altLang="en-US" dirty="0" smtClean="0"/>
+              <a:t>我们把相关的材料，程序</a:t>
+            </a:r>
+            <a:r>
+              <a:rPr lang="en-US" altLang="zh-CN" dirty="0" smtClean="0"/>
+              <a:t>/</a:t>
+            </a:r>
+            <a:r>
+              <a:rPr lang="zh-CN" altLang="en-US" dirty="0" smtClean="0"/>
+              <a:t>脚本的源代码都放到了</a:t>
+            </a:r>
+            <a:r>
+              <a:rPr lang="en-US" altLang="zh-CN" dirty="0" err="1" smtClean="0"/>
+              <a:t>github</a:t>
+            </a:r>
+            <a:r>
+              <a:rPr lang="zh-CN" altLang="en-US" dirty="0" smtClean="0"/>
+              <a:t>上，大家可以通过扫描这个二维码查看我们的项目</a:t>
+            </a:r>
+            <a:endParaRPr lang="en-US" altLang="zh-CN" dirty="0" smtClean="0"/>
+          </a:p>
+          <a:p>
+            <a:r>
+              <a:rPr lang="zh-CN" altLang="en-US" dirty="0" smtClean="0"/>
+              <a:t>欢迎大家对我们的项目</a:t>
+            </a:r>
+            <a:r>
+              <a:rPr lang="en-US" altLang="zh-CN" dirty="0" smtClean="0"/>
+              <a:t>commit</a:t>
+            </a:r>
+            <a:endParaRPr lang="zh-CN" altLang="en-US" dirty="0"/>
+          </a:p>
+        </p:txBody>
+      </p:sp>
+      <p:sp>
+        <p:nvSpPr>
+          <p:cNvPr id="4" name="灯片编号占位符 3"/>
+          <p:cNvSpPr>
+            <a:spLocks noGrp="1"/>
+          </p:cNvSpPr>
+          <p:nvPr>
+            <p:ph type="sldNum" sz="quarter" idx="10"/>
+          </p:nvPr>
+        </p:nvSpPr>
+        <p:spPr/>
+        <p:txBody>
+          <a:bodyPr/>
+          <a:lstStyle/>
+          <a:p>
+            <a:fld id="{B45B17BA-6DD1-4F5E-AAD4-77158B0FD79C}" type="slidenum">
+              <a:rPr lang="zh-CN" altLang="en-US" smtClean="0"/>
+              <a:t>27</a:t>
+            </a:fld>
+            <a:endParaRPr lang="zh-CN" altLang="en-US"/>
+          </a:p>
+        </p:txBody>
+      </p:sp>
+    </p:spTree>
+    <p:extLst>
+      <p:ext uri="{BB962C8B-B14F-4D97-AF65-F5344CB8AC3E}">
+        <p14:creationId xmlns:p14="http://schemas.microsoft.com/office/powerpoint/2010/main" val="1556724422"/>
       </p:ext>
     </p:extLst>
   </p:cSld>
@@ -5932,44 +6331,9 @@
         <p:spPr/>
         <p:txBody>
           <a:bodyPr>
-            <a:normAutofit fontScale="92500" lnSpcReduction="20000"/>
+            <a:normAutofit fontScale="92500" lnSpcReduction="10000"/>
           </a:bodyPr>
           <a:lstStyle/>
-          <a:p>
-            <a:r>
-              <a:rPr lang="en-US" altLang="zh-CN" sz="1200" b="1" i="0" kern="1200" dirty="0" smtClean="0">
-                <a:solidFill>
-                  <a:schemeClr val="tx1"/>
-                </a:solidFill>
-                <a:latin typeface="+mn-lt"/>
-                <a:ea typeface="+mn-ea"/>
-                <a:cs typeface="+mn-cs"/>
-              </a:rPr>
-              <a:t>0x01 </a:t>
-            </a:r>
-            <a:r>
-              <a:rPr lang="zh-CN" altLang="en-US" sz="1200" b="1" i="0" kern="1200" dirty="0" smtClean="0">
-                <a:solidFill>
-                  <a:schemeClr val="tx1"/>
-                </a:solidFill>
-                <a:latin typeface="+mn-lt"/>
-                <a:ea typeface="+mn-ea"/>
-                <a:cs typeface="+mn-cs"/>
-              </a:rPr>
-              <a:t>一极独霸：</a:t>
-            </a:r>
-            <a:r>
-              <a:rPr lang="en-US" altLang="zh-CN" sz="1200" b="1" i="0" kern="1200" dirty="0" smtClean="0">
-                <a:solidFill>
-                  <a:schemeClr val="tx1"/>
-                </a:solidFill>
-                <a:latin typeface="+mn-lt"/>
-                <a:ea typeface="+mn-ea"/>
-                <a:cs typeface="+mn-cs"/>
-              </a:rPr>
-              <a:t>SQL</a:t>
-            </a:r>
-          </a:p>
           <a:p>
             <a:r>
               <a:rPr lang="zh-CN" altLang="en-US" sz="1200" b="0" i="0" kern="1200" dirty="0" smtClean="0">
@@ -5980,7 +6344,18 @@
                 <a:ea typeface="+mn-ea"/>
                 <a:cs typeface="+mn-cs"/>
               </a:rPr>
-              <a:t>在信息时代的初期，人们所能够处理的，只是日常的简单的数据，比如学生的成绩单、职员的工资表，这样的信息，也就是我们所说的 </a:t>
+              <a:t>在</a:t>
+            </a:r>
+            <a:r>
+              <a:rPr lang="zh-CN" altLang="en-US" sz="1200" b="0" i="0" kern="1200" dirty="0" smtClean="0">
+                <a:solidFill>
+                  <a:schemeClr val="tx1"/>
+                </a:solidFill>
+                <a:latin typeface="+mn-lt"/>
+                <a:ea typeface="+mn-ea"/>
+                <a:cs typeface="+mn-cs"/>
+              </a:rPr>
+              <a:t>信息时代的初期，人们所能够处理的，只是日常的简单的数据，比如学生的成绩单、职员的工资表，这样的信息，也就是我们所说的 </a:t>
             </a:r>
             <a:r>
               <a:rPr lang="zh-CN" altLang="en-US" sz="1200" b="1" i="1" kern="1200" dirty="0" smtClean="0">
@@ -6059,12 +6434,10 @@
                 <a:ea typeface="+mn-ea"/>
                 <a:cs typeface="+mn-cs"/>
               </a:rPr>
-              <a:t>无疑将关系型数据库的强大发挥到了极致。</a:t>
-            </a:r>
-          </a:p>
-          <a:p>
-            <a:r>
-              <a:rPr lang="en-US" altLang="zh-CN" sz="1200" b="1" i="0" kern="1200" dirty="0" smtClean="0">
+              <a:t>无疑将关系型数据库的强大发挥到</a:t>
+            </a:r>
+            <a:r>
+              <a:rPr lang="zh-CN" altLang="en-US" sz="1200" b="0" i="0" kern="1200" dirty="0" smtClean="0">
                 <a:solidFill>
                   <a:schemeClr val="tx1"/>
                 </a:solidFill>
@@ -6072,29 +6445,7 @@
                 <a:ea typeface="+mn-ea"/>
                 <a:cs typeface="+mn-cs"/>
               </a:rPr>
-              <a:t>0x02 </a:t>
-            </a:r>
-            <a:r>
-              <a:rPr lang="zh-CN" altLang="en-US" sz="1200" b="1" i="0" kern="1200" dirty="0" smtClean="0">
-                <a:solidFill>
-                  <a:schemeClr val="tx1"/>
-                </a:solidFill>
-                <a:latin typeface="+mn-lt"/>
-                <a:ea typeface="+mn-ea"/>
-                <a:cs typeface="+mn-cs"/>
-              </a:rPr>
-              <a:t>异军突起： </a:t>
-            </a:r>
-            <a:r>
-              <a:rPr lang="en-US" altLang="zh-CN" sz="1200" b="1" i="0" kern="1200" dirty="0" err="1" smtClean="0">
-                <a:solidFill>
-                  <a:schemeClr val="tx1"/>
-                </a:solidFill>
-                <a:latin typeface="+mn-lt"/>
-                <a:ea typeface="+mn-ea"/>
-                <a:cs typeface="+mn-cs"/>
-              </a:rPr>
-              <a:t>NoSQL</a:t>
+              <a:t>了极致。</a:t>
             </a:r>
             <a:endParaRPr lang="en-US" altLang="zh-CN" sz="1200" b="1" i="0" kern="1200" dirty="0" smtClean="0">
               <a:solidFill>
@@ -6769,12 +7120,20 @@
               <a:rPr lang="en-US" altLang="zh-CN" dirty="0" err="1" smtClean="0"/>
               <a:t>mysqlslap</a:t>
             </a:r>
+            <a:r>
+              <a:rPr lang="zh-CN" altLang="en-US" dirty="0" smtClean="0"/>
+              <a:t>作为我们的测试工具</a:t>
+            </a:r>
             <a:endParaRPr lang="en-US" altLang="zh-CN" dirty="0" smtClean="0"/>
           </a:p>
           <a:p>
             <a:r>
               <a:rPr lang="zh-CN" altLang="en-US" dirty="0" smtClean="0"/>
-              <a:t>其特点是语法简单</a:t>
+              <a:t>其</a:t>
+            </a:r>
+            <a:r>
+              <a:rPr lang="zh-CN" altLang="en-US" dirty="0" smtClean="0"/>
+              <a:t>特点是语法简单</a:t>
             </a:r>
             <a:r>
               <a:rPr lang="en-US" altLang="zh-CN" dirty="0" smtClean="0"/>
@@ -6834,7 +7193,19 @@
             </a:pPr>
             <a:r>
               <a:rPr lang="en-US" altLang="zh-CN" dirty="0" smtClean="0"/>
-              <a:t>YCSB(The Yahoo! Cloud Serving Benchmark)</a:t>
+              <a:t>YCSB</a:t>
+            </a:r>
+            <a:r>
+              <a:rPr lang="zh-CN" altLang="en-US" dirty="0" smtClean="0"/>
+              <a:t>，全称是</a:t>
+            </a:r>
+            <a:r>
+              <a:rPr lang="en-US" altLang="zh-CN" dirty="0" smtClean="0"/>
+              <a:t>(</a:t>
+            </a:r>
+            <a:r>
+              <a:rPr lang="en-US" altLang="zh-CN" dirty="0" smtClean="0"/>
+              <a:t>The Yahoo! Cloud Serving Benchmark)</a:t>
             </a:r>
             <a:r>
               <a:rPr lang="zh-CN" altLang="en-US" dirty="0" smtClean="0"/>
@@ -6876,7 +7247,15 @@
             </a:pPr>
             <a:r>
               <a:rPr lang="zh-CN" altLang="en-US" dirty="0" smtClean="0"/>
-              <a:t>还可以通过自定义其核心的</a:t>
+              <a:t>还可以</a:t>
+            </a:r>
+            <a:r>
+              <a:rPr lang="zh-CN" altLang="en-US" dirty="0" smtClean="0"/>
+              <a:t>通过重写其</a:t>
+            </a:r>
+            <a:r>
+              <a:rPr lang="zh-CN" altLang="en-US" dirty="0" smtClean="0"/>
+              <a:t>核心的</a:t>
             </a:r>
             <a:r>
               <a:rPr lang="en-US" altLang="zh-CN" dirty="0" smtClean="0"/>
@@ -6895,7 +7274,23 @@
             </a:pPr>
             <a:r>
               <a:rPr lang="zh-CN" altLang="en-US" dirty="0" smtClean="0"/>
-              <a:t>尽管这些工具很成熟，但是和我们的需求不是完全切合，所以在最后我们也自己写了各种脚本和代码来进行试验或对工具进行补充</a:t>
+              <a:t>尽管这些工具</a:t>
+            </a:r>
+            <a:r>
+              <a:rPr lang="zh-CN" altLang="en-US" dirty="0" smtClean="0"/>
+              <a:t>很强大，</a:t>
+            </a:r>
+            <a:r>
+              <a:rPr lang="zh-CN" altLang="en-US" dirty="0" smtClean="0"/>
+              <a:t>但是和我们的需求不是完全切合，所以在最后我们也自己写了各种脚本和</a:t>
+            </a:r>
+            <a:r>
+              <a:rPr lang="zh-CN" altLang="en-US" dirty="0" smtClean="0"/>
+              <a:t>代码对</a:t>
+            </a:r>
+            <a:r>
+              <a:rPr lang="zh-CN" altLang="en-US" dirty="0" smtClean="0"/>
+              <a:t>工具进行补充</a:t>
             </a:r>
             <a:endParaRPr lang="zh-CN" altLang="en-US" dirty="0"/>
           </a:p>
@@ -6991,16 +7386,24 @@
           </a:p>
           <a:p>
             <a:r>
-              <a:rPr lang="zh-CN" altLang="en-US" dirty="0" smtClean="0"/>
-              <a:t>操作系统和</a:t>
-            </a:r>
-            <a:r>
-              <a:rPr lang="en-US" altLang="zh-CN" dirty="0" err="1" smtClean="0"/>
-              <a:t>sql</a:t>
-            </a:r>
-            <a:r>
-              <a:rPr lang="zh-CN" altLang="en-US" dirty="0" smtClean="0"/>
-              <a:t>版本等相信大家都很熟悉，这里不赘述</a:t>
+              <a:rPr lang="en-US" altLang="zh-CN" dirty="0" smtClean="0"/>
+              <a:t>OS</a:t>
+            </a:r>
+            <a:r>
+              <a:rPr lang="zh-CN" altLang="en-US" dirty="0" smtClean="0"/>
+              <a:t>、</a:t>
+            </a:r>
+            <a:r>
+              <a:rPr lang="en-US" altLang="zh-CN" dirty="0" smtClean="0"/>
+              <a:t>CPU</a:t>
+            </a:r>
+            <a:r>
+              <a:rPr lang="zh-CN" altLang="en-US" dirty="0" smtClean="0"/>
+              <a:t>等相信</a:t>
+            </a:r>
+            <a:r>
+              <a:rPr lang="zh-CN" altLang="en-US" dirty="0" smtClean="0"/>
+              <a:t>大家都很熟悉，这里不赘述</a:t>
             </a:r>
             <a:endParaRPr lang="en-US" altLang="zh-CN" dirty="0" smtClean="0"/>
           </a:p>
@@ -7192,11 +7595,7 @@
           <a:p>
             <a:r>
               <a:rPr lang="zh-CN" altLang="en-US" dirty="0" smtClean="0"/>
-              <a:t>经过阅读各种文献，我们把时间</a:t>
-            </a:r>
-            <a:r>
-              <a:rPr lang="zh-CN" altLang="en-US" dirty="0" smtClean="0"/>
-              <a:t>，硬盘占用，</a:t>
+              <a:t>经过阅读各种文献，我们把时间，硬盘占用，</a:t>
             </a:r>
             <a:r>
               <a:rPr lang="en-US" altLang="zh-CN" dirty="0" smtClean="0"/>
@@ -7301,7 +7700,15 @@
           <a:p>
             <a:r>
               <a:rPr lang="zh-CN" altLang="en-US" dirty="0" smtClean="0"/>
-              <a:t>为了更好的比较，我们把实验分为了结构化数据和非结构化数据两部分</a:t>
+              <a:t>下面，我们将按结构化</a:t>
+            </a:r>
+            <a:r>
+              <a:rPr lang="zh-CN" altLang="en-US" dirty="0" smtClean="0"/>
+              <a:t>数据和非结构化数据两</a:t>
+            </a:r>
+            <a:r>
+              <a:rPr lang="zh-CN" altLang="en-US" dirty="0" smtClean="0"/>
+              <a:t>部分来介绍我们的实验</a:t>
             </a:r>
             <a:endParaRPr lang="zh-CN" altLang="en-US" dirty="0"/>
           </a:p>
@@ -10678,7 +11085,54 @@
           <a:p>
             <a:r>
               <a:rPr lang="zh-CN" altLang="en-US" sz="3200" dirty="0" smtClean="0"/>
-              <a:t>使用脚本生成统一的结构化数据集</a:t>
+              <a:t>使用</a:t>
+            </a:r>
+            <a:r>
+              <a:rPr lang="zh-CN" altLang="en-US" sz="3200" dirty="0" smtClean="0"/>
+              <a:t>脚本</a:t>
+            </a:r>
+            <a:r>
+              <a:rPr lang="zh-CN" altLang="en-US" sz="3200" dirty="0" smtClean="0"/>
+              <a:t>生成的统一</a:t>
+            </a:r>
+            <a:r>
+              <a:rPr lang="zh-CN" altLang="en-US" sz="3200" dirty="0" smtClean="0"/>
+              <a:t>的结构化数据</a:t>
+            </a:r>
+            <a:r>
+              <a:rPr lang="zh-CN" altLang="en-US" sz="3200" dirty="0" smtClean="0"/>
+              <a:t>集</a:t>
+            </a:r>
+            <a:endParaRPr lang="en-US" altLang="zh-CN" sz="3200" dirty="0" smtClean="0"/>
+          </a:p>
+          <a:p>
+            <a:r>
+              <a:rPr lang="zh-CN" altLang="en-US" sz="3200" dirty="0" smtClean="0"/>
+              <a:t>乌克兰公民信息数据集</a:t>
+            </a:r>
+            <a:endParaRPr lang="en-US" altLang="zh-CN" sz="3200" dirty="0" smtClean="0"/>
+          </a:p>
+          <a:p>
+            <a:r>
+              <a:rPr lang="zh-CN" altLang="en-US" sz="3200" dirty="0" smtClean="0"/>
+              <a:t>上海电信某天流量数据集</a:t>
+            </a:r>
+            <a:endParaRPr lang="en-US" altLang="zh-CN" sz="3200" dirty="0" smtClean="0"/>
+          </a:p>
+          <a:p>
+            <a:endParaRPr lang="en-US" altLang="zh-CN" sz="3200" dirty="0"/>
+          </a:p>
+          <a:p>
+            <a:r>
+              <a:rPr lang="zh-CN" altLang="en-US" sz="3200" dirty="0" smtClean="0"/>
+              <a:t>经过比较，选择了以脚本生成的数据集</a:t>
+            </a:r>
+            <a:endParaRPr lang="en-US" altLang="zh-CN" sz="3200" dirty="0" smtClean="0"/>
+          </a:p>
+          <a:p>
+            <a:r>
+              <a:rPr lang="zh-CN" altLang="en-US" sz="3200" dirty="0" smtClean="0"/>
+              <a:t>可以对表的结构进行更细致的定制</a:t>
             </a:r>
             <a:endParaRPr lang="zh-CN" altLang="en-US" sz="3200" dirty="0"/>
           </a:p>
@@ -10970,21 +11424,25 @@
           <a:p>
             <a:r>
               <a:rPr lang="zh-CN" altLang="en-US" sz="3600" dirty="0" smtClean="0"/>
+              <a:t>生成</a:t>
+            </a:r>
+            <a:r>
+              <a:rPr lang="zh-CN" altLang="en-US" sz="3600" dirty="0"/>
+              <a:t>脚本</a:t>
+            </a:r>
+            <a:endParaRPr lang="en-US" altLang="zh-CN" sz="3600" dirty="0"/>
+          </a:p>
+          <a:p>
+            <a:r>
+              <a:rPr lang="zh-CN" altLang="en-US" sz="3600" dirty="0" smtClean="0"/>
+              <a:t>性能检测</a:t>
+            </a:r>
+            <a:endParaRPr lang="en-US" altLang="zh-CN" sz="3600" dirty="0"/>
+          </a:p>
+          <a:p>
+            <a:r>
+              <a:rPr lang="zh-CN" altLang="en-US" sz="3600" dirty="0" smtClean="0"/>
               <a:t>预热</a:t>
-            </a:r>
-            <a:endParaRPr lang="en-US" altLang="zh-CN" sz="3600" dirty="0" smtClean="0"/>
-          </a:p>
-          <a:p>
-            <a:r>
-              <a:rPr lang="zh-CN" altLang="en-US" sz="3600" dirty="0" smtClean="0"/>
-              <a:t>编写程序生成脚本</a:t>
-            </a:r>
-            <a:endParaRPr lang="en-US" altLang="zh-CN" sz="3600" dirty="0" smtClean="0"/>
-          </a:p>
-          <a:p>
-            <a:r>
-              <a:rPr lang="zh-CN" altLang="en-US" sz="3600" dirty="0" smtClean="0"/>
-              <a:t>编写程序实现性能监视</a:t>
             </a:r>
             <a:endParaRPr lang="en-US" altLang="zh-CN" sz="3600" dirty="0" smtClean="0"/>
           </a:p>
@@ -10993,6 +11451,12 @@
               <a:rPr lang="zh-CN" altLang="en-US" sz="3600" dirty="0" smtClean="0"/>
               <a:t>运行</a:t>
             </a:r>
+            <a:endParaRPr lang="en-US" altLang="zh-CN" sz="3600" dirty="0" smtClean="0"/>
+          </a:p>
+          <a:p>
+            <a:pPr marL="0" indent="0">
+              <a:buNone/>
+            </a:pPr>
             <a:endParaRPr lang="zh-CN" altLang="en-US" sz="3600" dirty="0"/>
           </a:p>
         </p:txBody>
@@ -11052,7 +11516,7 @@
         </p:xfrm>
         <a:graphic>
           <a:graphicData uri="http://schemas.openxmlformats.org/drawingml/2006/chart">
-            <c:chart xmlns:c="http://schemas.openxmlformats.org/drawingml/2006/chart" xmlns:r="http://schemas.openxmlformats.org/officeDocument/2006/relationships" r:id="rId2"/>
+            <c:chart xmlns:c="http://schemas.openxmlformats.org/drawingml/2006/chart" xmlns:r="http://schemas.openxmlformats.org/officeDocument/2006/relationships" r:id="rId3"/>
           </a:graphicData>
         </a:graphic>
       </p:graphicFrame>
@@ -11250,7 +11714,7 @@
         </p:xfrm>
         <a:graphic>
           <a:graphicData uri="http://schemas.openxmlformats.org/drawingml/2006/chart">
-            <c:chart xmlns:c="http://schemas.openxmlformats.org/drawingml/2006/chart" xmlns:r="http://schemas.openxmlformats.org/officeDocument/2006/relationships" r:id="rId2"/>
+            <c:chart xmlns:c="http://schemas.openxmlformats.org/drawingml/2006/chart" xmlns:r="http://schemas.openxmlformats.org/officeDocument/2006/relationships" r:id="rId3"/>
           </a:graphicData>
         </a:graphic>
       </p:graphicFrame>
@@ -11332,7 +11796,7 @@
         </p:xfrm>
         <a:graphic>
           <a:graphicData uri="http://schemas.openxmlformats.org/drawingml/2006/chart">
-            <c:chart xmlns:c="http://schemas.openxmlformats.org/drawingml/2006/chart" xmlns:r="http://schemas.openxmlformats.org/officeDocument/2006/relationships" r:id="rId2"/>
+            <c:chart xmlns:c="http://schemas.openxmlformats.org/drawingml/2006/chart" xmlns:r="http://schemas.openxmlformats.org/officeDocument/2006/relationships" r:id="rId3"/>
           </a:graphicData>
         </a:graphic>
       </p:graphicFrame>
@@ -11408,57 +11872,62 @@
         </p:nvSpPr>
         <p:spPr/>
         <p:txBody>
-          <a:bodyPr/>
-          <a:lstStyle/>
-          <a:p>
-            <a:r>
-              <a:rPr lang="en-US" altLang="zh-CN" dirty="0" smtClean="0"/>
+          <a:bodyPr>
+            <a:normAutofit/>
+          </a:bodyPr>
+          <a:lstStyle/>
+          <a:p>
+            <a:r>
+              <a:rPr lang="en-US" altLang="zh-CN" sz="2800" dirty="0" smtClean="0"/>
               <a:t>MongoDB</a:t>
             </a:r>
             <a:r>
-              <a:rPr lang="zh-CN" altLang="en-US" dirty="0" smtClean="0"/>
+              <a:rPr lang="zh-CN" altLang="en-US" sz="2800" dirty="0" smtClean="0"/>
               <a:t>在查询速度上有极大的优势</a:t>
             </a:r>
-            <a:endParaRPr lang="en-US" altLang="zh-CN" dirty="0" smtClean="0"/>
-          </a:p>
-          <a:p>
-            <a:r>
-              <a:rPr lang="zh-CN" altLang="en-US" dirty="0" smtClean="0"/>
+            <a:endParaRPr lang="en-US" altLang="zh-CN" sz="2800" dirty="0" smtClean="0"/>
+          </a:p>
+          <a:p>
+            <a:r>
+              <a:rPr lang="zh-CN" altLang="en-US" sz="2800" dirty="0" smtClean="0"/>
               <a:t>但其是以巨大的索引空间来获得的这样的优势</a:t>
             </a:r>
-            <a:endParaRPr lang="en-US" altLang="zh-CN" dirty="0"/>
-          </a:p>
-          <a:p>
-            <a:endParaRPr lang="en-US" altLang="zh-CN" dirty="0" smtClean="0"/>
-          </a:p>
-          <a:p>
-            <a:r>
-              <a:rPr lang="zh-CN" altLang="en-US" dirty="0" smtClean="0"/>
-              <a:t>一些</a:t>
-            </a:r>
-            <a:r>
-              <a:rPr lang="zh-CN" altLang="en-US" dirty="0" smtClean="0"/>
-              <a:t>小的结论</a:t>
-            </a:r>
-            <a:endParaRPr lang="en-US" altLang="zh-CN" dirty="0" smtClean="0"/>
-          </a:p>
-          <a:p>
-            <a:r>
-              <a:rPr lang="zh-CN" altLang="en-US" dirty="0" smtClean="0"/>
-              <a:t>索引对查询的优化程度能够达到上百倍</a:t>
-            </a:r>
-            <a:endParaRPr lang="en-US" altLang="zh-CN" dirty="0" smtClean="0"/>
-          </a:p>
-          <a:p>
-            <a:r>
-              <a:rPr lang="en-US" altLang="zh-CN" dirty="0" smtClean="0"/>
-              <a:t>CPU</a:t>
-            </a:r>
-            <a:r>
-              <a:rPr lang="zh-CN" altLang="en-US" dirty="0" smtClean="0"/>
-              <a:t>和内存始终都没有占满</a:t>
-            </a:r>
-            <a:endParaRPr lang="en-US" altLang="zh-CN" dirty="0" smtClean="0"/>
+            <a:endParaRPr lang="en-US" altLang="zh-CN" sz="2800" dirty="0"/>
+          </a:p>
+          <a:p>
+            <a:endParaRPr lang="en-US" altLang="zh-CN" sz="2800" dirty="0" smtClean="0"/>
+          </a:p>
+          <a:p>
+            <a:r>
+              <a:rPr lang="zh-CN" altLang="en-US" sz="2800" dirty="0" smtClean="0"/>
+              <a:t>索引</a:t>
+            </a:r>
+            <a:r>
+              <a:rPr lang="zh-CN" altLang="en-US" sz="2800" dirty="0" smtClean="0"/>
+              <a:t>对查询的优化程度能够达到上百倍</a:t>
+            </a:r>
+            <a:endParaRPr lang="en-US" altLang="zh-CN" sz="2800" dirty="0" smtClean="0"/>
+          </a:p>
+          <a:p>
+            <a:r>
+              <a:rPr lang="zh-CN" altLang="en-US" sz="2800" dirty="0" smtClean="0"/>
+              <a:t>更新操作是最耗时的</a:t>
+            </a:r>
+            <a:endParaRPr lang="en-US" altLang="zh-CN" sz="2800" dirty="0" smtClean="0"/>
+          </a:p>
+          <a:p>
+            <a:r>
+              <a:rPr lang="en-US" altLang="zh-CN" sz="2800" dirty="0" smtClean="0"/>
+              <a:t>MongoDB</a:t>
+            </a:r>
+            <a:r>
+              <a:rPr lang="zh-CN" altLang="en-US" sz="2800" dirty="0" smtClean="0"/>
+              <a:t>在增删改查等方面消耗的时间近似</a:t>
+            </a:r>
+            <a:endParaRPr lang="en-US" altLang="zh-CN" sz="2800" dirty="0" smtClean="0"/>
+          </a:p>
+          <a:p>
+            <a:endParaRPr lang="en-US" altLang="zh-CN" sz="2400" dirty="0" smtClean="0"/>
           </a:p>
         </p:txBody>
       </p:sp>
@@ -11613,14 +12082,99 @@
         </p:nvSpPr>
         <p:spPr/>
         <p:txBody>
-          <a:bodyPr/>
-          <a:lstStyle/>
-          <a:p>
-            <a:r>
-              <a:rPr lang="en-US" altLang="zh-CN" dirty="0" smtClean="0"/>
+          <a:bodyPr>
+            <a:normAutofit/>
+          </a:bodyPr>
+          <a:lstStyle/>
+          <a:p>
+            <a:r>
+              <a:rPr lang="zh-CN" altLang="en-US" sz="2800" dirty="0"/>
+              <a:t>交大教务处</a:t>
+            </a:r>
+            <a:r>
+              <a:rPr lang="en-US" altLang="zh-CN" sz="2800" dirty="0" smtClean="0"/>
+              <a:t>Html</a:t>
+            </a:r>
+            <a:r>
+              <a:rPr lang="zh-CN" altLang="en-US" sz="2800" dirty="0" smtClean="0"/>
+              <a:t>代码</a:t>
+            </a:r>
+            <a:endParaRPr lang="en-US" altLang="zh-CN" sz="2800" dirty="0" smtClean="0"/>
+          </a:p>
+          <a:p>
+            <a:r>
+              <a:rPr lang="en-US" altLang="zh-CN" sz="2800" dirty="0" smtClean="0"/>
+              <a:t>//</a:t>
+            </a:r>
+            <a:r>
+              <a:rPr lang="zh-CN" altLang="en-US" sz="2800" dirty="0" smtClean="0"/>
+              <a:t>其实我这里想手写一段代码</a:t>
+            </a:r>
+            <a:r>
+              <a:rPr lang="en-US" altLang="zh-CN" sz="2800" dirty="0" smtClean="0"/>
+              <a:t>/DOM</a:t>
+            </a:r>
+            <a:r>
+              <a:rPr lang="zh-CN" altLang="en-US" sz="2800" dirty="0" smtClean="0"/>
+              <a:t>树来装装逼</a:t>
+            </a:r>
+            <a:endParaRPr lang="en-US" altLang="zh-CN" sz="2800" dirty="0" smtClean="0"/>
+          </a:p>
+          <a:p>
+            <a:r>
+              <a:rPr lang="en-US" altLang="zh-CN" sz="2800" dirty="0" smtClean="0"/>
+              <a:t>//</a:t>
+            </a:r>
+            <a:r>
+              <a:rPr lang="zh-CN" altLang="en-US" sz="2800" dirty="0" smtClean="0"/>
+              <a:t>生动形象的展示</a:t>
+            </a:r>
+            <a:r>
+              <a:rPr lang="en-US" altLang="zh-CN" sz="2800" dirty="0" smtClean="0"/>
               <a:t>html</a:t>
             </a:r>
-            <a:endParaRPr lang="zh-CN" altLang="en-US" dirty="0"/>
+            <a:r>
+              <a:rPr lang="zh-CN" altLang="en-US" sz="2800" dirty="0" smtClean="0"/>
+              <a:t>是啥</a:t>
+            </a:r>
+            <a:endParaRPr lang="en-US" altLang="zh-CN" sz="2800" dirty="0"/>
+          </a:p>
+          <a:p>
+            <a:r>
+              <a:rPr lang="zh-CN" altLang="en-US" sz="2800" dirty="0" smtClean="0"/>
+              <a:t>实现快照应用</a:t>
+            </a:r>
+            <a:endParaRPr lang="en-US" altLang="zh-CN" sz="2800" dirty="0" smtClean="0"/>
+          </a:p>
+          <a:p>
+            <a:endParaRPr lang="en-US" altLang="zh-CN" sz="2800" dirty="0"/>
+          </a:p>
+          <a:p>
+            <a:r>
+              <a:rPr lang="en-US" altLang="zh-CN" sz="2800" dirty="0" smtClean="0"/>
+              <a:t>//</a:t>
+            </a:r>
+            <a:r>
+              <a:rPr lang="zh-CN" altLang="en-US" sz="2800" dirty="0" smtClean="0"/>
+              <a:t>这里插一张对</a:t>
+            </a:r>
+            <a:r>
+              <a:rPr lang="en-US" altLang="zh-CN" sz="2800" dirty="0" err="1" smtClean="0"/>
+              <a:t>sql</a:t>
+            </a:r>
+            <a:r>
+              <a:rPr lang="zh-CN" altLang="en-US" sz="2800" dirty="0" smtClean="0"/>
+              <a:t>表的</a:t>
+            </a:r>
+            <a:r>
+              <a:rPr lang="en-US" altLang="zh-CN" sz="2800" dirty="0" err="1" smtClean="0"/>
+              <a:t>desc</a:t>
+            </a:r>
+            <a:r>
+              <a:rPr lang="zh-CN" altLang="en-US" sz="2800" dirty="0" smtClean="0"/>
+              <a:t>怎么样</a:t>
+            </a:r>
+            <a:endParaRPr lang="zh-CN" altLang="en-US" sz="2800" dirty="0"/>
           </a:p>
         </p:txBody>
       </p:sp>
@@ -11733,65 +12287,46 @@
           <a:chExt cx="0" cy="0"/>
         </a:xfrm>
       </p:grpSpPr>
-      <p:sp>
-        <p:nvSpPr>
-          <p:cNvPr id="2" name="标题 1"/>
-          <p:cNvSpPr>
-            <a:spLocks noGrp="1"/>
-          </p:cNvSpPr>
-          <p:nvPr>
-            <p:ph type="title"/>
-          </p:nvPr>
-        </p:nvSpPr>
-        <p:spPr/>
-        <p:txBody>
-          <a:bodyPr/>
-          <a:lstStyle/>
-          <a:p>
-            <a:r>
-              <a:rPr lang="zh-CN" altLang="en-US" dirty="0" smtClean="0"/>
-              <a:t>爬虫</a:t>
-            </a:r>
-            <a:endParaRPr lang="zh-CN" altLang="en-US" dirty="0"/>
-          </a:p>
-        </p:txBody>
-      </p:sp>
-      <p:sp>
-        <p:nvSpPr>
-          <p:cNvPr id="3" name="内容占位符 2"/>
-          <p:cNvSpPr>
-            <a:spLocks noGrp="1"/>
-          </p:cNvSpPr>
-          <p:nvPr>
-            <p:ph idx="1"/>
-          </p:nvPr>
-        </p:nvSpPr>
-        <p:spPr/>
-        <p:txBody>
-          <a:bodyPr/>
-          <a:lstStyle/>
-          <a:p>
-            <a:endParaRPr lang="zh-CN" altLang="en-US"/>
-          </a:p>
-        </p:txBody>
-      </p:sp>
+      <p:pic>
+        <p:nvPicPr>
+          <p:cNvPr id="3" name="图片 2"/>
+          <p:cNvPicPr>
+            <a:picLocks noChangeAspect="1"/>
+          </p:cNvPicPr>
+          <p:nvPr/>
+        </p:nvPicPr>
+        <p:blipFill>
+          <a:blip r:embed="rId2">
+            <a:extLst>
+              <a:ext uri="{28A0092B-C50C-407E-A947-70E740481C1C}">
+                <a14:useLocalDpi xmlns:a14="http://schemas.microsoft.com/office/drawing/2010/main" val="0"/>
+              </a:ext>
+            </a:extLst>
+          </a:blip>
+          <a:stretch>
+            <a:fillRect/>
+          </a:stretch>
+        </p:blipFill>
+        <p:spPr>
+          <a:xfrm>
+            <a:off x="676275" y="887656"/>
+            <a:ext cx="10369516" cy="5055944"/>
+          </a:xfrm>
+          <a:prstGeom prst="rect">
+            <a:avLst/>
+          </a:prstGeom>
+        </p:spPr>
+      </p:pic>
     </p:spTree>
     <p:extLst>
       <p:ext uri="{BB962C8B-B14F-4D97-AF65-F5344CB8AC3E}">
-        <p14:creationId xmlns:p14="http://schemas.microsoft.com/office/powerpoint/2010/main" val="3191566217"/>
+        <p14:creationId xmlns:p14="http://schemas.microsoft.com/office/powerpoint/2010/main" val="3927975358"/>
       </p:ext>
     </p:extLst>
   </p:cSld>
   <p:clrMapOvr>
     <a:masterClrMapping/>
   </p:clrMapOvr>
-  <p:timing>
-    <p:tnLst>
-      <p:par>
-        <p:cTn id="1" dur="indefinite" restart="never" nodeType="tmRoot"/>
-      </p:par>
-    </p:tnLst>
-  </p:timing>
 </p:sld>
 </file>
 
@@ -11828,12 +12363,8 @@
           <a:lstStyle/>
           <a:p>
             <a:r>
-              <a:rPr lang="en-US" altLang="zh-CN" dirty="0" smtClean="0"/>
-              <a:t>SQL &amp; </a:t>
-            </a:r>
-            <a:r>
-              <a:rPr lang="en-US" altLang="zh-CN" dirty="0" err="1" smtClean="0"/>
-              <a:t>nOSQL</a:t>
+              <a:rPr lang="zh-CN" altLang="en-US" dirty="0" smtClean="0"/>
+              <a:t>爬虫</a:t>
             </a:r>
             <a:endParaRPr lang="zh-CN" altLang="en-US" dirty="0"/>
           </a:p>
@@ -11854,50 +12385,14 @@
           <a:bodyPr/>
           <a:lstStyle/>
           <a:p>
-            <a:r>
-              <a:rPr lang="en-US" altLang="zh-CN" sz="3600" dirty="0" smtClean="0"/>
-              <a:t>SQL</a:t>
-            </a:r>
-            <a:r>
-              <a:rPr lang="zh-CN" altLang="en-US" sz="3600" dirty="0" smtClean="0"/>
-              <a:t>：还原</a:t>
-            </a:r>
-            <a:r>
-              <a:rPr lang="en-US" altLang="zh-CN" sz="3600" dirty="0" smtClean="0"/>
-              <a:t>DOM</a:t>
-            </a:r>
-            <a:r>
-              <a:rPr lang="zh-CN" altLang="en-US" sz="3600" dirty="0" smtClean="0"/>
-              <a:t>树</a:t>
-            </a:r>
-            <a:endParaRPr lang="en-US" altLang="zh-CN" sz="3600" dirty="0" smtClean="0"/>
-          </a:p>
-          <a:p>
-            <a:r>
-              <a:rPr lang="en-US" altLang="zh-CN" sz="3600" dirty="0" err="1" smtClean="0"/>
-              <a:t>NoSQL</a:t>
-            </a:r>
-            <a:r>
-              <a:rPr lang="zh-CN" altLang="en-US" sz="3600" dirty="0" smtClean="0"/>
-              <a:t>：查询</a:t>
-            </a:r>
-            <a:r>
-              <a:rPr lang="en-US" altLang="zh-CN" sz="3600" dirty="0" smtClean="0"/>
-              <a:t>JSON</a:t>
-            </a:r>
-          </a:p>
-          <a:p>
-            <a:pPr>
-              <a:buNone/>
-            </a:pPr>
-            <a:endParaRPr lang="zh-CN" altLang="en-US" dirty="0"/>
+            <a:endParaRPr lang="zh-CN" altLang="en-US"/>
           </a:p>
         </p:txBody>
       </p:sp>
     </p:spTree>
     <p:extLst>
       <p:ext uri="{BB962C8B-B14F-4D97-AF65-F5344CB8AC3E}">
-        <p14:creationId xmlns:p14="http://schemas.microsoft.com/office/powerpoint/2010/main" val="3057942509"/>
+        <p14:creationId xmlns:p14="http://schemas.microsoft.com/office/powerpoint/2010/main" val="3191566217"/>
       </p:ext>
     </p:extLst>
   </p:cSld>
@@ -11947,8 +12442,16 @@
           <a:lstStyle/>
           <a:p>
             <a:r>
-              <a:rPr lang="zh-CN" altLang="en-US" dirty="0" smtClean="0"/>
-              <a:t>结果</a:t>
+              <a:rPr lang="en-US" altLang="zh-CN" dirty="0" smtClean="0"/>
+              <a:t>SQL </a:t>
+            </a:r>
+            <a:r>
+              <a:rPr lang="en-US" altLang="zh-CN" dirty="0" smtClean="0"/>
+              <a:t>vs </a:t>
+            </a:r>
+            <a:r>
+              <a:rPr lang="en-US" altLang="zh-CN" dirty="0" err="1" smtClean="0"/>
+              <a:t>nOSQL</a:t>
             </a:r>
             <a:endParaRPr lang="zh-CN" altLang="en-US" dirty="0"/>
           </a:p>
@@ -11970,36 +12473,41 @@
           <a:lstStyle/>
           <a:p>
             <a:r>
-              <a:rPr lang="zh-CN" altLang="en-US" dirty="0" smtClean="0"/>
-              <a:t>对我们爬取到的</a:t>
-            </a:r>
-            <a:r>
-              <a:rPr lang="en-US" altLang="zh-CN" dirty="0" err="1" smtClean="0"/>
-              <a:t>url</a:t>
-            </a:r>
-            <a:r>
-              <a:rPr lang="zh-CN" altLang="en-US" dirty="0" smtClean="0"/>
-              <a:t>进行查询，</a:t>
-            </a:r>
-            <a:r>
-              <a:rPr lang="en-US" altLang="zh-CN" dirty="0" smtClean="0"/>
-              <a:t>MongoDB</a:t>
-            </a:r>
-            <a:r>
-              <a:rPr lang="zh-CN" altLang="en-US" dirty="0" smtClean="0"/>
-              <a:t>的时间是毫秒级的</a:t>
-            </a:r>
-            <a:endParaRPr lang="en-US" altLang="zh-CN" dirty="0" smtClean="0"/>
-          </a:p>
-          <a:p>
-            <a:r>
-              <a:rPr lang="en-US" altLang="zh-CN" dirty="0" err="1" smtClean="0"/>
-              <a:t>Mysql</a:t>
-            </a:r>
-            <a:r>
-              <a:rPr lang="zh-CN" altLang="en-US" dirty="0" smtClean="0"/>
-              <a:t>却需要几十秒近一分钟</a:t>
-            </a:r>
+              <a:rPr lang="en-US" altLang="zh-CN" sz="3600" dirty="0" smtClean="0"/>
+              <a:t>SQL</a:t>
+            </a:r>
+            <a:r>
+              <a:rPr lang="zh-CN" altLang="en-US" sz="3600" dirty="0" smtClean="0"/>
+              <a:t>：还原</a:t>
+            </a:r>
+            <a:r>
+              <a:rPr lang="en-US" altLang="zh-CN" sz="3600" dirty="0" smtClean="0"/>
+              <a:t>DOM</a:t>
+            </a:r>
+            <a:r>
+              <a:rPr lang="zh-CN" altLang="en-US" sz="3600" dirty="0" smtClean="0"/>
+              <a:t>树</a:t>
+            </a:r>
+            <a:endParaRPr lang="en-US" altLang="zh-CN" sz="3600" dirty="0" smtClean="0"/>
+          </a:p>
+          <a:p>
+            <a:r>
+              <a:rPr lang="en-US" altLang="zh-CN" sz="3600" dirty="0" err="1" smtClean="0"/>
+              <a:t>NoSQL</a:t>
+            </a:r>
+            <a:r>
+              <a:rPr lang="zh-CN" altLang="en-US" sz="3600" dirty="0" smtClean="0"/>
+              <a:t>：查询</a:t>
+            </a:r>
+            <a:r>
+              <a:rPr lang="en-US" altLang="zh-CN" sz="3600" dirty="0" smtClean="0"/>
+              <a:t>JSON</a:t>
+            </a:r>
+          </a:p>
+          <a:p>
+            <a:pPr>
+              <a:buNone/>
+            </a:pPr>
             <a:endParaRPr lang="zh-CN" altLang="en-US" dirty="0"/>
           </a:p>
         </p:txBody>
@@ -12007,7 +12515,7 @@
     </p:spTree>
     <p:extLst>
       <p:ext uri="{BB962C8B-B14F-4D97-AF65-F5344CB8AC3E}">
-        <p14:creationId xmlns:p14="http://schemas.microsoft.com/office/powerpoint/2010/main" val="1537432367"/>
+        <p14:creationId xmlns:p14="http://schemas.microsoft.com/office/powerpoint/2010/main" val="3057942509"/>
       </p:ext>
     </p:extLst>
   </p:cSld>
@@ -12058,7 +12566,7 @@
           <a:p>
             <a:r>
               <a:rPr lang="zh-CN" altLang="en-US" dirty="0" smtClean="0"/>
-              <a:t>结论</a:t>
+              <a:t>结果</a:t>
             </a:r>
             <a:endParaRPr lang="zh-CN" altLang="en-US" dirty="0"/>
           </a:p>
@@ -12076,29 +12584,60 @@
         </p:nvSpPr>
         <p:spPr/>
         <p:txBody>
-          <a:bodyPr/>
-          <a:lstStyle/>
-          <a:p>
-            <a:r>
-              <a:rPr lang="zh-CN" altLang="en-US" dirty="0" smtClean="0"/>
-              <a:t>显示出了</a:t>
-            </a:r>
-            <a:r>
-              <a:rPr lang="en-US" altLang="zh-CN" dirty="0" err="1" smtClean="0"/>
-              <a:t>mongodb</a:t>
-            </a:r>
-            <a:r>
-              <a:rPr lang="zh-CN" altLang="en-US" dirty="0" smtClean="0"/>
-              <a:t>在非结构化数据上的巨大优势</a:t>
-            </a:r>
-            <a:endParaRPr lang="zh-CN" altLang="en-US" dirty="0"/>
+          <a:bodyPr>
+            <a:normAutofit/>
+          </a:bodyPr>
+          <a:lstStyle/>
+          <a:p>
+            <a:r>
+              <a:rPr lang="en-US" altLang="zh-CN" sz="3600" dirty="0" smtClean="0"/>
+              <a:t>MongoDB</a:t>
+            </a:r>
+            <a:r>
+              <a:rPr lang="zh-CN" altLang="en-US" sz="3600" dirty="0" smtClean="0"/>
+              <a:t>的时间是毫秒级</a:t>
+            </a:r>
+            <a:r>
+              <a:rPr lang="zh-CN" altLang="en-US" sz="3600" dirty="0" smtClean="0"/>
+              <a:t>的</a:t>
+            </a:r>
+            <a:endParaRPr lang="en-US" altLang="zh-CN" sz="3600" dirty="0" smtClean="0"/>
+          </a:p>
+          <a:p>
+            <a:r>
+              <a:rPr lang="zh-CN" altLang="en-US" sz="3600" dirty="0" smtClean="0"/>
+              <a:t>逻辑简单，数行代码完成</a:t>
+            </a:r>
+            <a:endParaRPr lang="en-US" altLang="zh-CN" sz="3600" dirty="0" smtClean="0"/>
+          </a:p>
+          <a:p>
+            <a:r>
+              <a:rPr lang="en-US" altLang="zh-CN" sz="3600" dirty="0" err="1" smtClean="0"/>
+              <a:t>Mysql</a:t>
+            </a:r>
+            <a:r>
+              <a:rPr lang="zh-CN" altLang="en-US" sz="3600" dirty="0" smtClean="0"/>
+              <a:t>却需要几十秒近</a:t>
+            </a:r>
+            <a:r>
+              <a:rPr lang="zh-CN" altLang="en-US" sz="3600" dirty="0" smtClean="0"/>
+              <a:t>一分钟</a:t>
+            </a:r>
+            <a:endParaRPr lang="en-US" altLang="zh-CN" sz="3600" dirty="0" smtClean="0"/>
+          </a:p>
+          <a:p>
+            <a:r>
+              <a:rPr lang="zh-CN" altLang="en-US" sz="3600" dirty="0" smtClean="0"/>
+              <a:t>逻辑复杂，近百行代码完成</a:t>
+            </a:r>
+            <a:endParaRPr lang="zh-CN" altLang="en-US" sz="3600" dirty="0"/>
           </a:p>
         </p:txBody>
       </p:sp>
     </p:spTree>
     <p:extLst>
       <p:ext uri="{BB962C8B-B14F-4D97-AF65-F5344CB8AC3E}">
-        <p14:creationId xmlns:p14="http://schemas.microsoft.com/office/powerpoint/2010/main" val="2707663877"/>
+        <p14:creationId xmlns:p14="http://schemas.microsoft.com/office/powerpoint/2010/main" val="1537432367"/>
       </p:ext>
     </p:extLst>
   </p:cSld>
@@ -12149,7 +12688,7 @@
           <a:p>
             <a:r>
               <a:rPr lang="zh-CN" altLang="en-US" dirty="0" smtClean="0"/>
-              <a:t>总结</a:t>
+              <a:t>结论</a:t>
             </a:r>
             <a:endParaRPr lang="zh-CN" altLang="en-US" dirty="0"/>
           </a:p>
@@ -12157,27 +12696,37 @@
       </p:sp>
       <p:sp>
         <p:nvSpPr>
-          <p:cNvPr id="3" name="文本占位符 2"/>
-          <p:cNvSpPr>
-            <a:spLocks noGrp="1"/>
-          </p:cNvSpPr>
-          <p:nvPr>
-            <p:ph type="body" idx="1"/>
-          </p:nvPr>
-        </p:nvSpPr>
-        <p:spPr/>
-        <p:txBody>
-          <a:bodyPr/>
-          <a:lstStyle/>
-          <a:p>
-            <a:endParaRPr lang="zh-CN" altLang="en-US"/>
+          <p:cNvPr id="3" name="内容占位符 2"/>
+          <p:cNvSpPr>
+            <a:spLocks noGrp="1"/>
+          </p:cNvSpPr>
+          <p:nvPr>
+            <p:ph idx="1"/>
+          </p:nvPr>
+        </p:nvSpPr>
+        <p:spPr/>
+        <p:txBody>
+          <a:bodyPr>
+            <a:normAutofit/>
+          </a:bodyPr>
+          <a:lstStyle/>
+          <a:p>
+            <a:r>
+              <a:rPr lang="en-US" altLang="zh-CN" sz="2800" dirty="0" smtClean="0"/>
+              <a:t>MongoDB</a:t>
+            </a:r>
+            <a:r>
+              <a:rPr lang="zh-CN" altLang="en-US" sz="2800" dirty="0" smtClean="0"/>
+              <a:t>在处理非结构化的数据上有十分巨大的优势</a:t>
+            </a:r>
+            <a:endParaRPr lang="zh-CN" altLang="en-US" sz="2800" dirty="0"/>
           </a:p>
         </p:txBody>
       </p:sp>
     </p:spTree>
     <p:extLst>
       <p:ext uri="{BB962C8B-B14F-4D97-AF65-F5344CB8AC3E}">
-        <p14:creationId xmlns:p14="http://schemas.microsoft.com/office/powerpoint/2010/main" val="1095675855"/>
+        <p14:creationId xmlns:p14="http://schemas.microsoft.com/office/powerpoint/2010/main" val="2707663877"/>
       </p:ext>
     </p:extLst>
   </p:cSld>
@@ -12228,7 +12777,7 @@
           <a:p>
             <a:r>
               <a:rPr lang="zh-CN" altLang="en-US" dirty="0" smtClean="0"/>
-              <a:t>参考文献</a:t>
+              <a:t>总结</a:t>
             </a:r>
             <a:endParaRPr lang="zh-CN" altLang="en-US" dirty="0"/>
           </a:p>
@@ -12236,134 +12785,27 @@
       </p:sp>
       <p:sp>
         <p:nvSpPr>
-          <p:cNvPr id="3" name="内容占位符 2"/>
-          <p:cNvSpPr>
-            <a:spLocks noGrp="1"/>
-          </p:cNvSpPr>
-          <p:nvPr>
-            <p:ph idx="1"/>
-          </p:nvPr>
-        </p:nvSpPr>
-        <p:spPr/>
-        <p:txBody>
-          <a:bodyPr>
-            <a:normAutofit fontScale="92500" lnSpcReduction="20000"/>
-          </a:bodyPr>
-          <a:lstStyle/>
-          <a:p>
-            <a:r>
-              <a:rPr lang="en-US" altLang="zh-CN" dirty="0"/>
-              <a:t>[1]Li Y, </a:t>
-            </a:r>
-            <a:r>
-              <a:rPr lang="en-US" altLang="zh-CN" dirty="0" err="1"/>
-              <a:t>Manoharan</a:t>
-            </a:r>
-            <a:r>
-              <a:rPr lang="en-US" altLang="zh-CN" dirty="0"/>
-              <a:t> S. A performance comparison of SQL and NoSQL databases[C]//Communications, Computers and Signal Processing (PACRIM), 2013 IEEE Pacific Rim Conference on. IEEE, 2013: 15-19.</a:t>
-            </a:r>
-          </a:p>
-          <a:p>
-            <a:r>
-              <a:rPr lang="en-US" altLang="zh-CN" dirty="0"/>
-              <a:t>[2]Li X, Zhou W. Performance Comparison of Hive, Impala and Spark SQL[C]//Intelligent Human-Machine Systems and Cybernetics (IHMSC), 2015 7th International Conference on. IEEE, 2015, 1: 418-423.</a:t>
-            </a:r>
-          </a:p>
-          <a:p>
-            <a:r>
-              <a:rPr lang="en-US" altLang="zh-CN" dirty="0"/>
-              <a:t>[3]</a:t>
-            </a:r>
-            <a:r>
-              <a:rPr lang="en-US" altLang="zh-CN" dirty="0" err="1"/>
-              <a:t>Aboutorabi</a:t>
-            </a:r>
-            <a:r>
-              <a:rPr lang="en-US" altLang="zh-CN" dirty="0"/>
-              <a:t> S H, </a:t>
-            </a:r>
-            <a:r>
-              <a:rPr lang="en-US" altLang="zh-CN" dirty="0" err="1"/>
-              <a:t>Rezapour</a:t>
-            </a:r>
-            <a:r>
-              <a:rPr lang="en-US" altLang="zh-CN" dirty="0"/>
-              <a:t> M, </a:t>
-            </a:r>
-            <a:r>
-              <a:rPr lang="en-US" altLang="zh-CN" dirty="0" err="1"/>
-              <a:t>Moradi</a:t>
-            </a:r>
-            <a:r>
-              <a:rPr lang="en-US" altLang="zh-CN" dirty="0"/>
-              <a:t> M, et al. Performance evaluation of SQL and MongoDB databases for big e-commerce data[C]//Computer Science and Software Engineering (CSSE), 2015 International Symposium on. IEEE, 2015: 1-7.</a:t>
-            </a:r>
-          </a:p>
-          <a:p>
-            <a:r>
-              <a:rPr lang="en-US" altLang="zh-CN" dirty="0"/>
-              <a:t>[4]Van der Veen J S, Van der </a:t>
-            </a:r>
-            <a:r>
-              <a:rPr lang="en-US" altLang="zh-CN" dirty="0" err="1"/>
-              <a:t>Waaij</a:t>
-            </a:r>
-            <a:r>
-              <a:rPr lang="en-US" altLang="zh-CN" dirty="0"/>
-              <a:t> B, Meijer R J. Sensor data storage performance: </a:t>
-            </a:r>
-            <a:r>
-              <a:rPr lang="en-US" altLang="zh-CN" dirty="0" err="1"/>
-              <a:t>Sql</a:t>
-            </a:r>
-            <a:r>
-              <a:rPr lang="en-US" altLang="zh-CN" dirty="0"/>
-              <a:t> or </a:t>
-            </a:r>
-            <a:r>
-              <a:rPr lang="en-US" altLang="zh-CN" dirty="0" err="1"/>
-              <a:t>nosql</a:t>
-            </a:r>
-            <a:r>
-              <a:rPr lang="en-US" altLang="zh-CN" dirty="0"/>
-              <a:t>, physical or virtual[C]//Cloud Computing (CLOUD), 2012 IEEE 5th International Conference on. IEEE, 2012: 431-438.</a:t>
-            </a:r>
-          </a:p>
-          <a:p>
-            <a:r>
-              <a:rPr lang="en-US" altLang="zh-CN" dirty="0"/>
-              <a:t>[5]</a:t>
-            </a:r>
-            <a:r>
-              <a:rPr lang="en-US" altLang="zh-CN" dirty="0" err="1"/>
-              <a:t>Schmid</a:t>
-            </a:r>
-            <a:r>
-              <a:rPr lang="en-US" altLang="zh-CN" dirty="0"/>
-              <a:t> S, </a:t>
-            </a:r>
-            <a:r>
-              <a:rPr lang="en-US" altLang="zh-CN" dirty="0" err="1"/>
-              <a:t>Galicz</a:t>
-            </a:r>
-            <a:r>
-              <a:rPr lang="en-US" altLang="zh-CN" dirty="0"/>
-              <a:t> E, Reinhardt W. WMS performance of selected SQL and NoSQL databases[C]// Military Technologies (ICMT), 2015 International Conference on. IEEE, 2015.</a:t>
-            </a:r>
-          </a:p>
-          <a:p>
-            <a:endParaRPr lang="en-US" altLang="zh-CN" dirty="0"/>
-          </a:p>
-          <a:p>
-            <a:endParaRPr lang="zh-CN" altLang="en-US" dirty="0"/>
+          <p:cNvPr id="3" name="文本占位符 2"/>
+          <p:cNvSpPr>
+            <a:spLocks noGrp="1"/>
+          </p:cNvSpPr>
+          <p:nvPr>
+            <p:ph type="body" idx="1"/>
+          </p:nvPr>
+        </p:nvSpPr>
+        <p:spPr/>
+        <p:txBody>
+          <a:bodyPr/>
+          <a:lstStyle/>
+          <a:p>
+            <a:endParaRPr lang="zh-CN" altLang="en-US"/>
           </a:p>
         </p:txBody>
       </p:sp>
     </p:spTree>
     <p:extLst>
       <p:ext uri="{BB962C8B-B14F-4D97-AF65-F5344CB8AC3E}">
-        <p14:creationId xmlns:p14="http://schemas.microsoft.com/office/powerpoint/2010/main" val="363289034"/>
+        <p14:creationId xmlns:p14="http://schemas.microsoft.com/office/powerpoint/2010/main" val="1095675855"/>
       </p:ext>
     </p:extLst>
   </p:cSld>
@@ -12413,6 +12855,192 @@
           <a:lstStyle/>
           <a:p>
             <a:r>
+              <a:rPr lang="zh-CN" altLang="en-US" dirty="0" smtClean="0"/>
+              <a:t>参考文献</a:t>
+            </a:r>
+            <a:endParaRPr lang="zh-CN" altLang="en-US" dirty="0"/>
+          </a:p>
+        </p:txBody>
+      </p:sp>
+      <p:sp>
+        <p:nvSpPr>
+          <p:cNvPr id="3" name="内容占位符 2"/>
+          <p:cNvSpPr>
+            <a:spLocks noGrp="1"/>
+          </p:cNvSpPr>
+          <p:nvPr>
+            <p:ph idx="1"/>
+          </p:nvPr>
+        </p:nvSpPr>
+        <p:spPr/>
+        <p:txBody>
+          <a:bodyPr>
+            <a:normAutofit fontScale="92500" lnSpcReduction="20000"/>
+          </a:bodyPr>
+          <a:lstStyle/>
+          <a:p>
+            <a:r>
+              <a:rPr lang="en-US" altLang="zh-CN" dirty="0"/>
+              <a:t>[1]Li Y, </a:t>
+            </a:r>
+            <a:r>
+              <a:rPr lang="en-US" altLang="zh-CN" dirty="0" err="1"/>
+              <a:t>Manoharan</a:t>
+            </a:r>
+            <a:r>
+              <a:rPr lang="en-US" altLang="zh-CN" dirty="0"/>
+              <a:t> S. A performance comparison of SQL and NoSQL databases[C]//Communications, Computers and Signal Processing (PACRIM), 2013 IEEE Pacific Rim Conference on. IEEE, 2013: 15-19.</a:t>
+            </a:r>
+          </a:p>
+          <a:p>
+            <a:r>
+              <a:rPr lang="en-US" altLang="zh-CN" dirty="0"/>
+              <a:t>[2]Li X, Zhou W. Performance Comparison of Hive, Impala and Spark SQL[C]//Intelligent Human-Machine Systems and Cybernetics (IHMSC), 2015 7th International Conference on. IEEE, 2015, 1: 418-423.</a:t>
+            </a:r>
+          </a:p>
+          <a:p>
+            <a:r>
+              <a:rPr lang="en-US" altLang="zh-CN" dirty="0"/>
+              <a:t>[3]</a:t>
+            </a:r>
+            <a:r>
+              <a:rPr lang="en-US" altLang="zh-CN" dirty="0" err="1"/>
+              <a:t>Aboutorabi</a:t>
+            </a:r>
+            <a:r>
+              <a:rPr lang="en-US" altLang="zh-CN" dirty="0"/>
+              <a:t> S H, </a:t>
+            </a:r>
+            <a:r>
+              <a:rPr lang="en-US" altLang="zh-CN" dirty="0" err="1"/>
+              <a:t>Rezapour</a:t>
+            </a:r>
+            <a:r>
+              <a:rPr lang="en-US" altLang="zh-CN" dirty="0"/>
+              <a:t> M, </a:t>
+            </a:r>
+            <a:r>
+              <a:rPr lang="en-US" altLang="zh-CN" dirty="0" err="1"/>
+              <a:t>Moradi</a:t>
+            </a:r>
+            <a:r>
+              <a:rPr lang="en-US" altLang="zh-CN" dirty="0"/>
+              <a:t> M, et al. Performance evaluation of SQL and MongoDB databases for big e-commerce data[C]//Computer Science and Software Engineering (CSSE), 2015 International Symposium on. IEEE, 2015: 1-7.</a:t>
+            </a:r>
+          </a:p>
+          <a:p>
+            <a:r>
+              <a:rPr lang="en-US" altLang="zh-CN" dirty="0"/>
+              <a:t>[4]Van der Veen J S, Van der </a:t>
+            </a:r>
+            <a:r>
+              <a:rPr lang="en-US" altLang="zh-CN" dirty="0" err="1"/>
+              <a:t>Waaij</a:t>
+            </a:r>
+            <a:r>
+              <a:rPr lang="en-US" altLang="zh-CN" dirty="0"/>
+              <a:t> B, Meijer R J. Sensor data storage performance: </a:t>
+            </a:r>
+            <a:r>
+              <a:rPr lang="en-US" altLang="zh-CN" dirty="0" err="1"/>
+              <a:t>Sql</a:t>
+            </a:r>
+            <a:r>
+              <a:rPr lang="en-US" altLang="zh-CN" dirty="0"/>
+              <a:t> or </a:t>
+            </a:r>
+            <a:r>
+              <a:rPr lang="en-US" altLang="zh-CN" dirty="0" err="1"/>
+              <a:t>nosql</a:t>
+            </a:r>
+            <a:r>
+              <a:rPr lang="en-US" altLang="zh-CN" dirty="0"/>
+              <a:t>, physical or virtual[C]//Cloud Computing (CLOUD), 2012 IEEE 5th International Conference on. IEEE, 2012: 431-438.</a:t>
+            </a:r>
+          </a:p>
+          <a:p>
+            <a:r>
+              <a:rPr lang="en-US" altLang="zh-CN" dirty="0"/>
+              <a:t>[5]</a:t>
+            </a:r>
+            <a:r>
+              <a:rPr lang="en-US" altLang="zh-CN" dirty="0" err="1"/>
+              <a:t>Schmid</a:t>
+            </a:r>
+            <a:r>
+              <a:rPr lang="en-US" altLang="zh-CN" dirty="0"/>
+              <a:t> S, </a:t>
+            </a:r>
+            <a:r>
+              <a:rPr lang="en-US" altLang="zh-CN" dirty="0" err="1"/>
+              <a:t>Galicz</a:t>
+            </a:r>
+            <a:r>
+              <a:rPr lang="en-US" altLang="zh-CN" dirty="0"/>
+              <a:t> E, Reinhardt W. WMS performance of selected SQL and NoSQL databases[C]// Military Technologies (ICMT), 2015 International Conference on. IEEE, 2015.</a:t>
+            </a:r>
+          </a:p>
+          <a:p>
+            <a:endParaRPr lang="en-US" altLang="zh-CN" dirty="0"/>
+          </a:p>
+          <a:p>
+            <a:endParaRPr lang="zh-CN" altLang="en-US" dirty="0"/>
+          </a:p>
+        </p:txBody>
+      </p:sp>
+    </p:spTree>
+    <p:extLst>
+      <p:ext uri="{BB962C8B-B14F-4D97-AF65-F5344CB8AC3E}">
+        <p14:creationId xmlns:p14="http://schemas.microsoft.com/office/powerpoint/2010/main" val="363289034"/>
+      </p:ext>
+    </p:extLst>
+  </p:cSld>
+  <p:clrMapOvr>
+    <a:masterClrMapping/>
+  </p:clrMapOvr>
+  <p:timing>
+    <p:tnLst>
+      <p:par>
+        <p:cTn id="1" dur="indefinite" restart="never" nodeType="tmRoot"/>
+      </p:par>
+    </p:tnLst>
+  </p:timing>
+</p:sld>
+</file>
+
+<file path=ppt/slides/slide27.xml><?xml version="1.0" encoding="utf-8"?>
+<p:sld xmlns:a="http://schemas.openxmlformats.org/drawingml/2006/main" xmlns:r="http://schemas.openxmlformats.org/officeDocument/2006/relationships" xmlns:p="http://schemas.openxmlformats.org/presentationml/2006/main">
+  <p:cSld>
+    <p:spTree>
+      <p:nvGrpSpPr>
+        <p:cNvPr id="1" name=""/>
+        <p:cNvGrpSpPr/>
+        <p:nvPr/>
+      </p:nvGrpSpPr>
+      <p:grpSpPr>
+        <a:xfrm>
+          <a:off x="0" y="0"/>
+          <a:ext cx="0" cy="0"/>
+          <a:chOff x="0" y="0"/>
+          <a:chExt cx="0" cy="0"/>
+        </a:xfrm>
+      </p:grpSpPr>
+      <p:sp>
+        <p:nvSpPr>
+          <p:cNvPr id="2" name="标题 1"/>
+          <p:cNvSpPr>
+            <a:spLocks noGrp="1"/>
+          </p:cNvSpPr>
+          <p:nvPr>
+            <p:ph type="title"/>
+          </p:nvPr>
+        </p:nvSpPr>
+        <p:spPr/>
+        <p:txBody>
+          <a:bodyPr/>
+          <a:lstStyle/>
+          <a:p>
+            <a:r>
               <a:rPr lang="en-US" altLang="zh-CN" dirty="0" err="1" smtClean="0"/>
               <a:t>GitHub</a:t>
             </a:r>
@@ -12462,7 +13090,7 @@
 </p:sld>
 </file>
 
-<file path=ppt/slides/slide27.xml><?xml version="1.0" encoding="utf-8"?>
+<file path=ppt/slides/slide28.xml><?xml version="1.0" encoding="utf-8"?>
 <p:sld xmlns:a="http://schemas.openxmlformats.org/drawingml/2006/main" xmlns:r="http://schemas.openxmlformats.org/officeDocument/2006/relationships" xmlns:p="http://schemas.openxmlformats.org/presentationml/2006/main">
   <p:cSld>
     <p:spTree>
@@ -12660,7 +13288,12 @@
             <p:ph type="title"/>
           </p:nvPr>
         </p:nvSpPr>
-        <p:spPr/>
+        <p:spPr>
+          <a:xfrm>
+            <a:off x="1202919" y="231422"/>
+            <a:ext cx="9784080" cy="1508760"/>
+          </a:xfrm>
+        </p:spPr>
         <p:txBody>
           <a:bodyPr/>
           <a:lstStyle/>
@@ -12683,7 +13316,12 @@
             <p:ph idx="1"/>
           </p:nvPr>
         </p:nvSpPr>
-        <p:spPr/>
+        <p:spPr>
+          <a:xfrm>
+            <a:off x="1202919" y="2082018"/>
+            <a:ext cx="9784080" cy="4206240"/>
+          </a:xfrm>
+        </p:spPr>
         <p:txBody>
           <a:bodyPr/>
           <a:lstStyle/>
@@ -12982,12 +13620,16 @@
           </a:p>
           <a:p>
             <a:r>
-              <a:rPr lang="en-US" altLang="zh-CN" sz="3600" dirty="0" err="1"/>
+              <a:rPr lang="en-US" altLang="zh-CN" sz="3600" dirty="0" err="1" smtClean="0"/>
               <a:t>CPU:Intel</a:t>
             </a:r>
             <a:r>
+              <a:rPr lang="en-US" altLang="zh-CN" sz="3600" dirty="0" smtClean="0"/>
+              <a:t>(R</a:t>
+            </a:r>
+            <a:r>
               <a:rPr lang="en-US" altLang="zh-CN" sz="3600" dirty="0"/>
-              <a:t>(R) Core(TM) i5-4210M CPU @ </a:t>
+              <a:t>) Core(TM) i5-4210M CPU @ </a:t>
             </a:r>
             <a:r>
               <a:rPr lang="en-US" altLang="zh-CN" sz="3600" dirty="0" smtClean="0"/>
@@ -13143,7 +13785,6 @@
               <a:rPr lang="en-US" altLang="zh-CN" sz="4800" dirty="0" smtClean="0"/>
               <a:t>CPU</a:t>
             </a:r>
-            <a:endParaRPr lang="en-US" altLang="zh-CN" sz="4800" dirty="0" smtClean="0"/>
           </a:p>
           <a:p>
             <a:r>

</xml_diff>